<commit_message>
Add memes because memes are important
</commit_message>
<xml_diff>
--- a/docs/React.js.pptx
+++ b/docs/React.js.pptx
@@ -4,30 +4,38 @@
   <p:sldMasterIdLst>
     <p:sldMasterId id="2147483648" r:id="rId1"/>
   </p:sldMasterIdLst>
+  <p:notesMasterIdLst>
+    <p:notesMasterId r:id="rId30"/>
+  </p:notesMasterIdLst>
   <p:sldIdLst>
     <p:sldId id="256" r:id="rId2"/>
-    <p:sldId id="257" r:id="rId3"/>
-    <p:sldId id="258" r:id="rId4"/>
-    <p:sldId id="259" r:id="rId5"/>
-    <p:sldId id="270" r:id="rId6"/>
-    <p:sldId id="261" r:id="rId7"/>
-    <p:sldId id="265" r:id="rId8"/>
-    <p:sldId id="267" r:id="rId9"/>
-    <p:sldId id="266" r:id="rId10"/>
-    <p:sldId id="260" r:id="rId11"/>
-    <p:sldId id="264" r:id="rId12"/>
-    <p:sldId id="268" r:id="rId13"/>
-    <p:sldId id="269" r:id="rId14"/>
-    <p:sldId id="271" r:id="rId15"/>
-    <p:sldId id="275" r:id="rId16"/>
-    <p:sldId id="272" r:id="rId17"/>
-    <p:sldId id="273" r:id="rId18"/>
-    <p:sldId id="274" r:id="rId19"/>
-    <p:sldId id="262" r:id="rId20"/>
-    <p:sldId id="278" r:id="rId21"/>
-    <p:sldId id="263" r:id="rId22"/>
-    <p:sldId id="276" r:id="rId23"/>
-    <p:sldId id="277" r:id="rId24"/>
+    <p:sldId id="279" r:id="rId3"/>
+    <p:sldId id="257" r:id="rId4"/>
+    <p:sldId id="258" r:id="rId5"/>
+    <p:sldId id="259" r:id="rId6"/>
+    <p:sldId id="270" r:id="rId7"/>
+    <p:sldId id="261" r:id="rId8"/>
+    <p:sldId id="265" r:id="rId9"/>
+    <p:sldId id="267" r:id="rId10"/>
+    <p:sldId id="266" r:id="rId11"/>
+    <p:sldId id="260" r:id="rId12"/>
+    <p:sldId id="264" r:id="rId13"/>
+    <p:sldId id="268" r:id="rId14"/>
+    <p:sldId id="269" r:id="rId15"/>
+    <p:sldId id="271" r:id="rId16"/>
+    <p:sldId id="275" r:id="rId17"/>
+    <p:sldId id="272" r:id="rId18"/>
+    <p:sldId id="273" r:id="rId19"/>
+    <p:sldId id="274" r:id="rId20"/>
+    <p:sldId id="280" r:id="rId21"/>
+    <p:sldId id="281" r:id="rId22"/>
+    <p:sldId id="282" r:id="rId23"/>
+    <p:sldId id="262" r:id="rId24"/>
+    <p:sldId id="278" r:id="rId25"/>
+    <p:sldId id="263" r:id="rId26"/>
+    <p:sldId id="276" r:id="rId27"/>
+    <p:sldId id="277" r:id="rId28"/>
+    <p:sldId id="283" r:id="rId29"/>
   </p:sldIdLst>
   <p:sldSz cx="12192000" cy="6858000"/>
   <p:notesSz cx="6858000" cy="9144000"/>
@@ -132,6 +140,7 @@
         <p14:section name="Introduction" id="{865F5404-B8EB-496B-B253-09020DDE542D}">
           <p14:sldIdLst>
             <p14:sldId id="256"/>
+            <p14:sldId id="279"/>
             <p14:sldId id="257"/>
             <p14:sldId id="258"/>
             <p14:sldId id="259"/>
@@ -157,6 +166,9 @@
             <p14:sldId id="272"/>
             <p14:sldId id="273"/>
             <p14:sldId id="274"/>
+            <p14:sldId id="280"/>
+            <p14:sldId id="281"/>
+            <p14:sldId id="282"/>
           </p14:sldIdLst>
         </p14:section>
         <p14:section name="What's Next?" id="{347EB858-79AA-4EFF-8C70-1CB1AABC859C}">
@@ -166,6 +178,7 @@
             <p14:sldId id="263"/>
             <p14:sldId id="276"/>
             <p14:sldId id="277"/>
+            <p14:sldId id="283"/>
           </p14:sldIdLst>
         </p14:section>
       </p14:sectionLst>
@@ -175,6 +188,807 @@
     </p:ext>
   </p:extLst>
 </p:presentation>
+</file>
+
+<file path=ppt/notesMasters/notesMaster1.xml><?xml version="1.0" encoding="utf-8"?>
+<p:notesMaster xmlns:a="http://schemas.openxmlformats.org/drawingml/2006/main" xmlns:r="http://schemas.openxmlformats.org/officeDocument/2006/relationships" xmlns:p="http://schemas.openxmlformats.org/presentationml/2006/main">
+  <p:cSld>
+    <p:bg>
+      <p:bgRef idx="1001">
+        <a:schemeClr val="bg1"/>
+      </p:bgRef>
+    </p:bg>
+    <p:spTree>
+      <p:nvGrpSpPr>
+        <p:cNvPr id="1" name=""/>
+        <p:cNvGrpSpPr/>
+        <p:nvPr/>
+      </p:nvGrpSpPr>
+      <p:grpSpPr>
+        <a:xfrm>
+          <a:off x="0" y="0"/>
+          <a:ext cx="0" cy="0"/>
+          <a:chOff x="0" y="0"/>
+          <a:chExt cx="0" cy="0"/>
+        </a:xfrm>
+      </p:grpSpPr>
+      <p:sp>
+        <p:nvSpPr>
+          <p:cNvPr id="2" name="Header Placeholder 1"/>
+          <p:cNvSpPr>
+            <a:spLocks noGrp="1"/>
+          </p:cNvSpPr>
+          <p:nvPr>
+            <p:ph type="hdr" sz="quarter"/>
+          </p:nvPr>
+        </p:nvSpPr>
+        <p:spPr>
+          <a:xfrm>
+            <a:off x="0" y="0"/>
+            <a:ext cx="2971800" cy="458788"/>
+          </a:xfrm>
+          <a:prstGeom prst="rect">
+            <a:avLst/>
+          </a:prstGeom>
+        </p:spPr>
+        <p:txBody>
+          <a:bodyPr vert="horz" lIns="91440" tIns="45720" rIns="91440" bIns="45720" rtlCol="0"/>
+          <a:lstStyle>
+            <a:lvl1pPr algn="l">
+              <a:defRPr sz="1200"/>
+            </a:lvl1pPr>
+          </a:lstStyle>
+          <a:p>
+            <a:endParaRPr lang="en-PH"/>
+          </a:p>
+        </p:txBody>
+      </p:sp>
+      <p:sp>
+        <p:nvSpPr>
+          <p:cNvPr id="3" name="Date Placeholder 2"/>
+          <p:cNvSpPr>
+            <a:spLocks noGrp="1"/>
+          </p:cNvSpPr>
+          <p:nvPr>
+            <p:ph type="dt" idx="1"/>
+          </p:nvPr>
+        </p:nvSpPr>
+        <p:spPr>
+          <a:xfrm>
+            <a:off x="3884613" y="0"/>
+            <a:ext cx="2971800" cy="458788"/>
+          </a:xfrm>
+          <a:prstGeom prst="rect">
+            <a:avLst/>
+          </a:prstGeom>
+        </p:spPr>
+        <p:txBody>
+          <a:bodyPr vert="horz" lIns="91440" tIns="45720" rIns="91440" bIns="45720" rtlCol="0"/>
+          <a:lstStyle>
+            <a:lvl1pPr algn="r">
+              <a:defRPr sz="1200"/>
+            </a:lvl1pPr>
+          </a:lstStyle>
+          <a:p>
+            <a:fld id="{F56E0E1B-9202-4A81-901F-AF2C8C73E66A}" type="datetimeFigureOut">
+              <a:rPr lang="en-PH" smtClean="0"/>
+              <a:t>07/04/2018</a:t>
+            </a:fld>
+            <a:endParaRPr lang="en-PH"/>
+          </a:p>
+        </p:txBody>
+      </p:sp>
+      <p:sp>
+        <p:nvSpPr>
+          <p:cNvPr id="4" name="Slide Image Placeholder 3"/>
+          <p:cNvSpPr>
+            <a:spLocks noGrp="1" noRot="1" noChangeAspect="1"/>
+          </p:cNvSpPr>
+          <p:nvPr>
+            <p:ph type="sldImg" idx="2"/>
+          </p:nvPr>
+        </p:nvSpPr>
+        <p:spPr>
+          <a:xfrm>
+            <a:off x="685800" y="1143000"/>
+            <a:ext cx="5486400" cy="3086100"/>
+          </a:xfrm>
+          <a:prstGeom prst="rect">
+            <a:avLst/>
+          </a:prstGeom>
+          <a:noFill/>
+          <a:ln w="12700">
+            <a:solidFill>
+              <a:prstClr val="black"/>
+            </a:solidFill>
+          </a:ln>
+        </p:spPr>
+        <p:txBody>
+          <a:bodyPr vert="horz" lIns="91440" tIns="45720" rIns="91440" bIns="45720" rtlCol="0" anchor="ctr"/>
+          <a:lstStyle/>
+          <a:p>
+            <a:endParaRPr lang="en-PH"/>
+          </a:p>
+        </p:txBody>
+      </p:sp>
+      <p:sp>
+        <p:nvSpPr>
+          <p:cNvPr id="5" name="Notes Placeholder 4"/>
+          <p:cNvSpPr>
+            <a:spLocks noGrp="1"/>
+          </p:cNvSpPr>
+          <p:nvPr>
+            <p:ph type="body" sz="quarter" idx="3"/>
+          </p:nvPr>
+        </p:nvSpPr>
+        <p:spPr>
+          <a:xfrm>
+            <a:off x="685800" y="4400550"/>
+            <a:ext cx="5486400" cy="3600450"/>
+          </a:xfrm>
+          <a:prstGeom prst="rect">
+            <a:avLst/>
+          </a:prstGeom>
+        </p:spPr>
+        <p:txBody>
+          <a:bodyPr vert="horz" lIns="91440" tIns="45720" rIns="91440" bIns="45720" rtlCol="0"/>
+          <a:lstStyle/>
+          <a:p>
+            <a:pPr lvl="0"/>
+            <a:r>
+              <a:rPr lang="en-US"/>
+              <a:t>Edit Master text styles</a:t>
+            </a:r>
+          </a:p>
+          <a:p>
+            <a:pPr lvl="1"/>
+            <a:r>
+              <a:rPr lang="en-US"/>
+              <a:t>Second level</a:t>
+            </a:r>
+          </a:p>
+          <a:p>
+            <a:pPr lvl="2"/>
+            <a:r>
+              <a:rPr lang="en-US"/>
+              <a:t>Third level</a:t>
+            </a:r>
+          </a:p>
+          <a:p>
+            <a:pPr lvl="3"/>
+            <a:r>
+              <a:rPr lang="en-US"/>
+              <a:t>Fourth level</a:t>
+            </a:r>
+          </a:p>
+          <a:p>
+            <a:pPr lvl="4"/>
+            <a:r>
+              <a:rPr lang="en-US"/>
+              <a:t>Fifth level</a:t>
+            </a:r>
+            <a:endParaRPr lang="en-PH"/>
+          </a:p>
+        </p:txBody>
+      </p:sp>
+      <p:sp>
+        <p:nvSpPr>
+          <p:cNvPr id="6" name="Footer Placeholder 5"/>
+          <p:cNvSpPr>
+            <a:spLocks noGrp="1"/>
+          </p:cNvSpPr>
+          <p:nvPr>
+            <p:ph type="ftr" sz="quarter" idx="4"/>
+          </p:nvPr>
+        </p:nvSpPr>
+        <p:spPr>
+          <a:xfrm>
+            <a:off x="0" y="8685213"/>
+            <a:ext cx="2971800" cy="458787"/>
+          </a:xfrm>
+          <a:prstGeom prst="rect">
+            <a:avLst/>
+          </a:prstGeom>
+        </p:spPr>
+        <p:txBody>
+          <a:bodyPr vert="horz" lIns="91440" tIns="45720" rIns="91440" bIns="45720" rtlCol="0" anchor="b"/>
+          <a:lstStyle>
+            <a:lvl1pPr algn="l">
+              <a:defRPr sz="1200"/>
+            </a:lvl1pPr>
+          </a:lstStyle>
+          <a:p>
+            <a:endParaRPr lang="en-PH"/>
+          </a:p>
+        </p:txBody>
+      </p:sp>
+      <p:sp>
+        <p:nvSpPr>
+          <p:cNvPr id="7" name="Slide Number Placeholder 6"/>
+          <p:cNvSpPr>
+            <a:spLocks noGrp="1"/>
+          </p:cNvSpPr>
+          <p:nvPr>
+            <p:ph type="sldNum" sz="quarter" idx="5"/>
+          </p:nvPr>
+        </p:nvSpPr>
+        <p:spPr>
+          <a:xfrm>
+            <a:off x="3884613" y="8685213"/>
+            <a:ext cx="2971800" cy="458787"/>
+          </a:xfrm>
+          <a:prstGeom prst="rect">
+            <a:avLst/>
+          </a:prstGeom>
+        </p:spPr>
+        <p:txBody>
+          <a:bodyPr vert="horz" lIns="91440" tIns="45720" rIns="91440" bIns="45720" rtlCol="0" anchor="b"/>
+          <a:lstStyle>
+            <a:lvl1pPr algn="r">
+              <a:defRPr sz="1200"/>
+            </a:lvl1pPr>
+          </a:lstStyle>
+          <a:p>
+            <a:fld id="{223FB4B1-BEF1-47D6-8DA8-9CB92A4BFD13}" type="slidenum">
+              <a:rPr lang="en-PH" smtClean="0"/>
+              <a:t>‹#›</a:t>
+            </a:fld>
+            <a:endParaRPr lang="en-PH"/>
+          </a:p>
+        </p:txBody>
+      </p:sp>
+    </p:spTree>
+    <p:extLst>
+      <p:ext uri="{BB962C8B-B14F-4D97-AF65-F5344CB8AC3E}">
+        <p14:creationId xmlns:p14="http://schemas.microsoft.com/office/powerpoint/2010/main" val="124291013"/>
+      </p:ext>
+    </p:extLst>
+  </p:cSld>
+  <p:clrMap bg1="lt1" tx1="dk1" bg2="lt2" tx2="dk2" accent1="accent1" accent2="accent2" accent3="accent3" accent4="accent4" accent5="accent5" accent6="accent6" hlink="hlink" folHlink="folHlink"/>
+  <p:notesStyle>
+    <a:lvl1pPr marL="0" algn="l" defTabSz="914400" rtl="0" eaLnBrk="1" latinLnBrk="0" hangingPunct="1">
+      <a:defRPr sz="1200" kern="1200">
+        <a:solidFill>
+          <a:schemeClr val="tx1"/>
+        </a:solidFill>
+        <a:latin typeface="+mn-lt"/>
+        <a:ea typeface="+mn-ea"/>
+        <a:cs typeface="+mn-cs"/>
+      </a:defRPr>
+    </a:lvl1pPr>
+    <a:lvl2pPr marL="457200" algn="l" defTabSz="914400" rtl="0" eaLnBrk="1" latinLnBrk="0" hangingPunct="1">
+      <a:defRPr sz="1200" kern="1200">
+        <a:solidFill>
+          <a:schemeClr val="tx1"/>
+        </a:solidFill>
+        <a:latin typeface="+mn-lt"/>
+        <a:ea typeface="+mn-ea"/>
+        <a:cs typeface="+mn-cs"/>
+      </a:defRPr>
+    </a:lvl2pPr>
+    <a:lvl3pPr marL="914400" algn="l" defTabSz="914400" rtl="0" eaLnBrk="1" latinLnBrk="0" hangingPunct="1">
+      <a:defRPr sz="1200" kern="1200">
+        <a:solidFill>
+          <a:schemeClr val="tx1"/>
+        </a:solidFill>
+        <a:latin typeface="+mn-lt"/>
+        <a:ea typeface="+mn-ea"/>
+        <a:cs typeface="+mn-cs"/>
+      </a:defRPr>
+    </a:lvl3pPr>
+    <a:lvl4pPr marL="1371600" algn="l" defTabSz="914400" rtl="0" eaLnBrk="1" latinLnBrk="0" hangingPunct="1">
+      <a:defRPr sz="1200" kern="1200">
+        <a:solidFill>
+          <a:schemeClr val="tx1"/>
+        </a:solidFill>
+        <a:latin typeface="+mn-lt"/>
+        <a:ea typeface="+mn-ea"/>
+        <a:cs typeface="+mn-cs"/>
+      </a:defRPr>
+    </a:lvl4pPr>
+    <a:lvl5pPr marL="1828800" algn="l" defTabSz="914400" rtl="0" eaLnBrk="1" latinLnBrk="0" hangingPunct="1">
+      <a:defRPr sz="1200" kern="1200">
+        <a:solidFill>
+          <a:schemeClr val="tx1"/>
+        </a:solidFill>
+        <a:latin typeface="+mn-lt"/>
+        <a:ea typeface="+mn-ea"/>
+        <a:cs typeface="+mn-cs"/>
+      </a:defRPr>
+    </a:lvl5pPr>
+    <a:lvl6pPr marL="2286000" algn="l" defTabSz="914400" rtl="0" eaLnBrk="1" latinLnBrk="0" hangingPunct="1">
+      <a:defRPr sz="1200" kern="1200">
+        <a:solidFill>
+          <a:schemeClr val="tx1"/>
+        </a:solidFill>
+        <a:latin typeface="+mn-lt"/>
+        <a:ea typeface="+mn-ea"/>
+        <a:cs typeface="+mn-cs"/>
+      </a:defRPr>
+    </a:lvl6pPr>
+    <a:lvl7pPr marL="2743200" algn="l" defTabSz="914400" rtl="0" eaLnBrk="1" latinLnBrk="0" hangingPunct="1">
+      <a:defRPr sz="1200" kern="1200">
+        <a:solidFill>
+          <a:schemeClr val="tx1"/>
+        </a:solidFill>
+        <a:latin typeface="+mn-lt"/>
+        <a:ea typeface="+mn-ea"/>
+        <a:cs typeface="+mn-cs"/>
+      </a:defRPr>
+    </a:lvl7pPr>
+    <a:lvl8pPr marL="3200400" algn="l" defTabSz="914400" rtl="0" eaLnBrk="1" latinLnBrk="0" hangingPunct="1">
+      <a:defRPr sz="1200" kern="1200">
+        <a:solidFill>
+          <a:schemeClr val="tx1"/>
+        </a:solidFill>
+        <a:latin typeface="+mn-lt"/>
+        <a:ea typeface="+mn-ea"/>
+        <a:cs typeface="+mn-cs"/>
+      </a:defRPr>
+    </a:lvl8pPr>
+    <a:lvl9pPr marL="3657600" algn="l" defTabSz="914400" rtl="0" eaLnBrk="1" latinLnBrk="0" hangingPunct="1">
+      <a:defRPr sz="1200" kern="1200">
+        <a:solidFill>
+          <a:schemeClr val="tx1"/>
+        </a:solidFill>
+        <a:latin typeface="+mn-lt"/>
+        <a:ea typeface="+mn-ea"/>
+        <a:cs typeface="+mn-cs"/>
+      </a:defRPr>
+    </a:lvl9pPr>
+  </p:notesStyle>
+</p:notesMaster>
+</file>
+
+<file path=ppt/notesSlides/notesSlide1.xml><?xml version="1.0" encoding="utf-8"?>
+<p:notes xmlns:a="http://schemas.openxmlformats.org/drawingml/2006/main" xmlns:r="http://schemas.openxmlformats.org/officeDocument/2006/relationships" xmlns:p="http://schemas.openxmlformats.org/presentationml/2006/main">
+  <p:cSld>
+    <p:spTree>
+      <p:nvGrpSpPr>
+        <p:cNvPr id="1" name=""/>
+        <p:cNvGrpSpPr/>
+        <p:nvPr/>
+      </p:nvGrpSpPr>
+      <p:grpSpPr>
+        <a:xfrm>
+          <a:off x="0" y="0"/>
+          <a:ext cx="0" cy="0"/>
+          <a:chOff x="0" y="0"/>
+          <a:chExt cx="0" cy="0"/>
+        </a:xfrm>
+      </p:grpSpPr>
+      <p:sp>
+        <p:nvSpPr>
+          <p:cNvPr id="2" name="Slide Image Placeholder 1"/>
+          <p:cNvSpPr>
+            <a:spLocks noGrp="1" noRot="1" noChangeAspect="1"/>
+          </p:cNvSpPr>
+          <p:nvPr>
+            <p:ph type="sldImg"/>
+          </p:nvPr>
+        </p:nvSpPr>
+        <p:spPr/>
+      </p:sp>
+      <p:sp>
+        <p:nvSpPr>
+          <p:cNvPr id="3" name="Notes Placeholder 2"/>
+          <p:cNvSpPr>
+            <a:spLocks noGrp="1"/>
+          </p:cNvSpPr>
+          <p:nvPr>
+            <p:ph type="body" idx="1"/>
+          </p:nvPr>
+        </p:nvSpPr>
+        <p:spPr/>
+        <p:txBody>
+          <a:bodyPr/>
+          <a:lstStyle/>
+          <a:p>
+            <a:r>
+              <a:rPr lang="en-PH" dirty="0"/>
+              <a:t>Ask</a:t>
+            </a:r>
+            <a:r>
+              <a:rPr lang="en-PH" baseline="0" dirty="0"/>
+              <a:t> questions “What the heck is React?”</a:t>
+            </a:r>
+          </a:p>
+          <a:p>
+            <a:r>
+              <a:rPr lang="en-PH" baseline="0" dirty="0"/>
+              <a:t>“If you’ve used something like Angular before, you will see the concept behind,</a:t>
+            </a:r>
+          </a:p>
+          <a:p>
+            <a:r>
+              <a:rPr lang="en-PH" baseline="0" dirty="0"/>
+              <a:t>If not, then you will understand how frameworks function”</a:t>
+            </a:r>
+            <a:endParaRPr lang="en-PH" dirty="0"/>
+          </a:p>
+        </p:txBody>
+      </p:sp>
+      <p:sp>
+        <p:nvSpPr>
+          <p:cNvPr id="4" name="Slide Number Placeholder 3"/>
+          <p:cNvSpPr>
+            <a:spLocks noGrp="1"/>
+          </p:cNvSpPr>
+          <p:nvPr>
+            <p:ph type="sldNum" sz="quarter" idx="10"/>
+          </p:nvPr>
+        </p:nvSpPr>
+        <p:spPr/>
+        <p:txBody>
+          <a:bodyPr/>
+          <a:lstStyle/>
+          <a:p>
+            <a:fld id="{223FB4B1-BEF1-47D6-8DA8-9CB92A4BFD13}" type="slidenum">
+              <a:rPr lang="en-PH" smtClean="0"/>
+              <a:t>2</a:t>
+            </a:fld>
+            <a:endParaRPr lang="en-PH"/>
+          </a:p>
+        </p:txBody>
+      </p:sp>
+    </p:spTree>
+    <p:extLst>
+      <p:ext uri="{BB962C8B-B14F-4D97-AF65-F5344CB8AC3E}">
+        <p14:creationId xmlns:p14="http://schemas.microsoft.com/office/powerpoint/2010/main" val="4237664734"/>
+      </p:ext>
+    </p:extLst>
+  </p:cSld>
+  <p:clrMapOvr>
+    <a:masterClrMapping/>
+  </p:clrMapOvr>
+</p:notes>
+</file>
+
+<file path=ppt/notesSlides/notesSlide2.xml><?xml version="1.0" encoding="utf-8"?>
+<p:notes xmlns:a="http://schemas.openxmlformats.org/drawingml/2006/main" xmlns:r="http://schemas.openxmlformats.org/officeDocument/2006/relationships" xmlns:p="http://schemas.openxmlformats.org/presentationml/2006/main">
+  <p:cSld>
+    <p:spTree>
+      <p:nvGrpSpPr>
+        <p:cNvPr id="1" name=""/>
+        <p:cNvGrpSpPr/>
+        <p:nvPr/>
+      </p:nvGrpSpPr>
+      <p:grpSpPr>
+        <a:xfrm>
+          <a:off x="0" y="0"/>
+          <a:ext cx="0" cy="0"/>
+          <a:chOff x="0" y="0"/>
+          <a:chExt cx="0" cy="0"/>
+        </a:xfrm>
+      </p:grpSpPr>
+      <p:sp>
+        <p:nvSpPr>
+          <p:cNvPr id="2" name="Slide Image Placeholder 1"/>
+          <p:cNvSpPr>
+            <a:spLocks noGrp="1" noRot="1" noChangeAspect="1"/>
+          </p:cNvSpPr>
+          <p:nvPr>
+            <p:ph type="sldImg"/>
+          </p:nvPr>
+        </p:nvSpPr>
+        <p:spPr/>
+      </p:sp>
+      <p:sp>
+        <p:nvSpPr>
+          <p:cNvPr id="3" name="Notes Placeholder 2"/>
+          <p:cNvSpPr>
+            <a:spLocks noGrp="1"/>
+          </p:cNvSpPr>
+          <p:nvPr>
+            <p:ph type="body" idx="1"/>
+          </p:nvPr>
+        </p:nvSpPr>
+        <p:spPr/>
+        <p:txBody>
+          <a:bodyPr/>
+          <a:lstStyle/>
+          <a:p>
+            <a:r>
+              <a:rPr lang="en-PH" dirty="0"/>
+              <a:t>Explain the reason for changing </a:t>
+            </a:r>
+            <a:r>
+              <a:rPr lang="en-PH" dirty="0" err="1"/>
+              <a:t>BSD+Patents</a:t>
+            </a:r>
+            <a:r>
+              <a:rPr lang="en-PH" dirty="0"/>
+              <a:t> to MIT</a:t>
+            </a:r>
+          </a:p>
+        </p:txBody>
+      </p:sp>
+      <p:sp>
+        <p:nvSpPr>
+          <p:cNvPr id="4" name="Slide Number Placeholder 3"/>
+          <p:cNvSpPr>
+            <a:spLocks noGrp="1"/>
+          </p:cNvSpPr>
+          <p:nvPr>
+            <p:ph type="sldNum" sz="quarter" idx="10"/>
+          </p:nvPr>
+        </p:nvSpPr>
+        <p:spPr/>
+        <p:txBody>
+          <a:bodyPr/>
+          <a:lstStyle/>
+          <a:p>
+            <a:fld id="{223FB4B1-BEF1-47D6-8DA8-9CB92A4BFD13}" type="slidenum">
+              <a:rPr lang="en-PH" smtClean="0"/>
+              <a:t>3</a:t>
+            </a:fld>
+            <a:endParaRPr lang="en-PH"/>
+          </a:p>
+        </p:txBody>
+      </p:sp>
+    </p:spTree>
+    <p:extLst>
+      <p:ext uri="{BB962C8B-B14F-4D97-AF65-F5344CB8AC3E}">
+        <p14:creationId xmlns:p14="http://schemas.microsoft.com/office/powerpoint/2010/main" val="3859506127"/>
+      </p:ext>
+    </p:extLst>
+  </p:cSld>
+  <p:clrMapOvr>
+    <a:masterClrMapping/>
+  </p:clrMapOvr>
+</p:notes>
+</file>
+
+<file path=ppt/notesSlides/notesSlide3.xml><?xml version="1.0" encoding="utf-8"?>
+<p:notes xmlns:a="http://schemas.openxmlformats.org/drawingml/2006/main" xmlns:r="http://schemas.openxmlformats.org/officeDocument/2006/relationships" xmlns:p="http://schemas.openxmlformats.org/presentationml/2006/main">
+  <p:cSld>
+    <p:spTree>
+      <p:nvGrpSpPr>
+        <p:cNvPr id="1" name=""/>
+        <p:cNvGrpSpPr/>
+        <p:nvPr/>
+      </p:nvGrpSpPr>
+      <p:grpSpPr>
+        <a:xfrm>
+          <a:off x="0" y="0"/>
+          <a:ext cx="0" cy="0"/>
+          <a:chOff x="0" y="0"/>
+          <a:chExt cx="0" cy="0"/>
+        </a:xfrm>
+      </p:grpSpPr>
+      <p:sp>
+        <p:nvSpPr>
+          <p:cNvPr id="2" name="Slide Image Placeholder 1"/>
+          <p:cNvSpPr>
+            <a:spLocks noGrp="1" noRot="1" noChangeAspect="1"/>
+          </p:cNvSpPr>
+          <p:nvPr>
+            <p:ph type="sldImg"/>
+          </p:nvPr>
+        </p:nvSpPr>
+        <p:spPr/>
+      </p:sp>
+      <p:sp>
+        <p:nvSpPr>
+          <p:cNvPr id="3" name="Notes Placeholder 2"/>
+          <p:cNvSpPr>
+            <a:spLocks noGrp="1"/>
+          </p:cNvSpPr>
+          <p:nvPr>
+            <p:ph type="body" idx="1"/>
+          </p:nvPr>
+        </p:nvSpPr>
+        <p:spPr/>
+        <p:txBody>
+          <a:bodyPr/>
+          <a:lstStyle/>
+          <a:p>
+            <a:endParaRPr lang="en-PH" dirty="0"/>
+          </a:p>
+        </p:txBody>
+      </p:sp>
+      <p:sp>
+        <p:nvSpPr>
+          <p:cNvPr id="4" name="Slide Number Placeholder 3"/>
+          <p:cNvSpPr>
+            <a:spLocks noGrp="1"/>
+          </p:cNvSpPr>
+          <p:nvPr>
+            <p:ph type="sldNum" sz="quarter" idx="10"/>
+          </p:nvPr>
+        </p:nvSpPr>
+        <p:spPr/>
+        <p:txBody>
+          <a:bodyPr/>
+          <a:lstStyle/>
+          <a:p>
+            <a:fld id="{223FB4B1-BEF1-47D6-8DA8-9CB92A4BFD13}" type="slidenum">
+              <a:rPr lang="en-PH" smtClean="0"/>
+              <a:t>5</a:t>
+            </a:fld>
+            <a:endParaRPr lang="en-PH"/>
+          </a:p>
+        </p:txBody>
+      </p:sp>
+    </p:spTree>
+    <p:extLst>
+      <p:ext uri="{BB962C8B-B14F-4D97-AF65-F5344CB8AC3E}">
+        <p14:creationId xmlns:p14="http://schemas.microsoft.com/office/powerpoint/2010/main" val="1594510133"/>
+      </p:ext>
+    </p:extLst>
+  </p:cSld>
+  <p:clrMapOvr>
+    <a:masterClrMapping/>
+  </p:clrMapOvr>
+</p:notes>
+</file>
+
+<file path=ppt/notesSlides/notesSlide4.xml><?xml version="1.0" encoding="utf-8"?>
+<p:notes xmlns:a="http://schemas.openxmlformats.org/drawingml/2006/main" xmlns:r="http://schemas.openxmlformats.org/officeDocument/2006/relationships" xmlns:p="http://schemas.openxmlformats.org/presentationml/2006/main">
+  <p:cSld>
+    <p:spTree>
+      <p:nvGrpSpPr>
+        <p:cNvPr id="1" name=""/>
+        <p:cNvGrpSpPr/>
+        <p:nvPr/>
+      </p:nvGrpSpPr>
+      <p:grpSpPr>
+        <a:xfrm>
+          <a:off x="0" y="0"/>
+          <a:ext cx="0" cy="0"/>
+          <a:chOff x="0" y="0"/>
+          <a:chExt cx="0" cy="0"/>
+        </a:xfrm>
+      </p:grpSpPr>
+      <p:sp>
+        <p:nvSpPr>
+          <p:cNvPr id="2" name="Slide Image Placeholder 1"/>
+          <p:cNvSpPr>
+            <a:spLocks noGrp="1" noRot="1" noChangeAspect="1"/>
+          </p:cNvSpPr>
+          <p:nvPr>
+            <p:ph type="sldImg"/>
+          </p:nvPr>
+        </p:nvSpPr>
+        <p:spPr/>
+      </p:sp>
+      <p:sp>
+        <p:nvSpPr>
+          <p:cNvPr id="3" name="Notes Placeholder 2"/>
+          <p:cNvSpPr>
+            <a:spLocks noGrp="1"/>
+          </p:cNvSpPr>
+          <p:nvPr>
+            <p:ph type="body" idx="1"/>
+          </p:nvPr>
+        </p:nvSpPr>
+        <p:spPr/>
+        <p:txBody>
+          <a:bodyPr/>
+          <a:lstStyle/>
+          <a:p>
+            <a:endParaRPr lang="en-PH" dirty="0"/>
+          </a:p>
+        </p:txBody>
+      </p:sp>
+      <p:sp>
+        <p:nvSpPr>
+          <p:cNvPr id="4" name="Slide Number Placeholder 3"/>
+          <p:cNvSpPr>
+            <a:spLocks noGrp="1"/>
+          </p:cNvSpPr>
+          <p:nvPr>
+            <p:ph type="sldNum" sz="quarter" idx="10"/>
+          </p:nvPr>
+        </p:nvSpPr>
+        <p:spPr/>
+        <p:txBody>
+          <a:bodyPr/>
+          <a:lstStyle/>
+          <a:p>
+            <a:fld id="{223FB4B1-BEF1-47D6-8DA8-9CB92A4BFD13}" type="slidenum">
+              <a:rPr lang="en-PH" smtClean="0"/>
+              <a:t>6</a:t>
+            </a:fld>
+            <a:endParaRPr lang="en-PH"/>
+          </a:p>
+        </p:txBody>
+      </p:sp>
+    </p:spTree>
+    <p:extLst>
+      <p:ext uri="{BB962C8B-B14F-4D97-AF65-F5344CB8AC3E}">
+        <p14:creationId xmlns:p14="http://schemas.microsoft.com/office/powerpoint/2010/main" val="2115621417"/>
+      </p:ext>
+    </p:extLst>
+  </p:cSld>
+  <p:clrMapOvr>
+    <a:masterClrMapping/>
+  </p:clrMapOvr>
+</p:notes>
+</file>
+
+<file path=ppt/notesSlides/notesSlide5.xml><?xml version="1.0" encoding="utf-8"?>
+<p:notes xmlns:a="http://schemas.openxmlformats.org/drawingml/2006/main" xmlns:r="http://schemas.openxmlformats.org/officeDocument/2006/relationships" xmlns:p="http://schemas.openxmlformats.org/presentationml/2006/main">
+  <p:cSld>
+    <p:spTree>
+      <p:nvGrpSpPr>
+        <p:cNvPr id="1" name=""/>
+        <p:cNvGrpSpPr/>
+        <p:nvPr/>
+      </p:nvGrpSpPr>
+      <p:grpSpPr>
+        <a:xfrm>
+          <a:off x="0" y="0"/>
+          <a:ext cx="0" cy="0"/>
+          <a:chOff x="0" y="0"/>
+          <a:chExt cx="0" cy="0"/>
+        </a:xfrm>
+      </p:grpSpPr>
+      <p:sp>
+        <p:nvSpPr>
+          <p:cNvPr id="2" name="Slide Image Placeholder 1"/>
+          <p:cNvSpPr>
+            <a:spLocks noGrp="1" noRot="1" noChangeAspect="1"/>
+          </p:cNvSpPr>
+          <p:nvPr>
+            <p:ph type="sldImg"/>
+          </p:nvPr>
+        </p:nvSpPr>
+        <p:spPr/>
+      </p:sp>
+      <p:sp>
+        <p:nvSpPr>
+          <p:cNvPr id="3" name="Notes Placeholder 2"/>
+          <p:cNvSpPr>
+            <a:spLocks noGrp="1"/>
+          </p:cNvSpPr>
+          <p:nvPr>
+            <p:ph type="body" idx="1"/>
+          </p:nvPr>
+        </p:nvSpPr>
+        <p:spPr/>
+        <p:txBody>
+          <a:bodyPr/>
+          <a:lstStyle/>
+          <a:p>
+            <a:endParaRPr lang="en-PH" dirty="0"/>
+          </a:p>
+        </p:txBody>
+      </p:sp>
+      <p:sp>
+        <p:nvSpPr>
+          <p:cNvPr id="4" name="Slide Number Placeholder 3"/>
+          <p:cNvSpPr>
+            <a:spLocks noGrp="1"/>
+          </p:cNvSpPr>
+          <p:nvPr>
+            <p:ph type="sldNum" sz="quarter" idx="10"/>
+          </p:nvPr>
+        </p:nvSpPr>
+        <p:spPr/>
+        <p:txBody>
+          <a:bodyPr/>
+          <a:lstStyle/>
+          <a:p>
+            <a:fld id="{223FB4B1-BEF1-47D6-8DA8-9CB92A4BFD13}" type="slidenum">
+              <a:rPr lang="en-PH" smtClean="0"/>
+              <a:t>8</a:t>
+            </a:fld>
+            <a:endParaRPr lang="en-PH"/>
+          </a:p>
+        </p:txBody>
+      </p:sp>
+    </p:spTree>
+    <p:extLst>
+      <p:ext uri="{BB962C8B-B14F-4D97-AF65-F5344CB8AC3E}">
+        <p14:creationId xmlns:p14="http://schemas.microsoft.com/office/powerpoint/2010/main" val="2722761371"/>
+      </p:ext>
+    </p:extLst>
+  </p:cSld>
+  <p:clrMapOvr>
+    <a:masterClrMapping/>
+  </p:clrMapOvr>
+</p:notes>
 </file>
 
 <file path=ppt/slideLayouts/slideLayout1.xml><?xml version="1.0" encoding="utf-8"?>
@@ -3883,7 +4697,7 @@
           <p:cNvPr id="2" name="Title 1">
             <a:extLst>
               <a:ext uri="{FF2B5EF4-FFF2-40B4-BE49-F238E27FC236}">
-                <a16:creationId xmlns:a16="http://schemas.microsoft.com/office/drawing/2014/main" id="{D292077E-955E-4468-96A3-267AA6C60995}"/>
+                <a16:creationId xmlns:a16="http://schemas.microsoft.com/office/drawing/2014/main" id="{4D574C09-5AE5-401C-9BE4-9E81768A21A8}"/>
               </a:ext>
             </a:extLst>
           </p:cNvPr>
@@ -3901,95 +4715,47 @@
           <a:p>
             <a:r>
               <a:rPr lang="en-PH" dirty="0"/>
-              <a:t>Components</a:t>
-            </a:r>
-          </a:p>
-        </p:txBody>
-      </p:sp>
-      <p:sp>
-        <p:nvSpPr>
-          <p:cNvPr id="3" name="Content Placeholder 2">
-            <a:extLst>
-              <a:ext uri="{FF2B5EF4-FFF2-40B4-BE49-F238E27FC236}">
-                <a16:creationId xmlns:a16="http://schemas.microsoft.com/office/drawing/2014/main" id="{54E4191A-0622-4F0F-A220-6D6D08C56839}"/>
-              </a:ext>
-            </a:extLst>
-          </p:cNvPr>
-          <p:cNvSpPr>
-            <a:spLocks noGrp="1"/>
-          </p:cNvSpPr>
+              <a:t>JSX - After</a:t>
+            </a:r>
+          </a:p>
+        </p:txBody>
+      </p:sp>
+      <p:pic>
+        <p:nvPicPr>
+          <p:cNvPr id="17" name="Content Placeholder 6">
+            <a:extLst>
+              <a:ext uri="{FF2B5EF4-FFF2-40B4-BE49-F238E27FC236}">
+                <a16:creationId xmlns:a16="http://schemas.microsoft.com/office/drawing/2014/main" id="{FCA6ED38-3FD2-4942-A959-5E79F05C5F82}"/>
+              </a:ext>
+            </a:extLst>
+          </p:cNvPr>
+          <p:cNvPicPr>
+            <a:picLocks noGrp="1" noChangeAspect="1"/>
+          </p:cNvPicPr>
           <p:nvPr>
             <p:ph idx="1"/>
           </p:nvPr>
-        </p:nvSpPr>
-        <p:spPr/>
-        <p:txBody>
-          <a:bodyPr/>
-          <a:lstStyle/>
-          <a:p>
-            <a:r>
-              <a:rPr lang="en-PH" dirty="0"/>
-              <a:t>A </a:t>
-            </a:r>
-            <a:r>
-              <a:rPr lang="en-PH" b="1" dirty="0"/>
-              <a:t>container</a:t>
-            </a:r>
-            <a:r>
-              <a:rPr lang="en-PH" dirty="0"/>
-              <a:t> for passing </a:t>
-            </a:r>
-            <a:r>
-              <a:rPr lang="en-PH" b="1" dirty="0"/>
-              <a:t>props</a:t>
-            </a:r>
-            <a:r>
-              <a:rPr lang="en-PH" dirty="0"/>
-              <a:t> (properties) and rendering a </a:t>
-            </a:r>
-            <a:r>
-              <a:rPr lang="en-PH" b="1" dirty="0"/>
-              <a:t>template</a:t>
-            </a:r>
-          </a:p>
-          <a:p>
-            <a:r>
-              <a:rPr lang="en-PH" dirty="0"/>
-              <a:t>Can be </a:t>
-            </a:r>
-            <a:r>
-              <a:rPr lang="en-PH" b="1" dirty="0"/>
-              <a:t>stateless</a:t>
-            </a:r>
-            <a:r>
-              <a:rPr lang="en-PH" dirty="0"/>
-              <a:t> (simple) or </a:t>
-            </a:r>
-            <a:r>
-              <a:rPr lang="en-PH" b="1" dirty="0"/>
-              <a:t>stateful</a:t>
-            </a:r>
-            <a:r>
-              <a:rPr lang="en-PH" dirty="0"/>
-              <a:t> (with state + optional lifecycle overrides)</a:t>
-            </a:r>
-          </a:p>
-          <a:p>
-            <a:r>
-              <a:rPr lang="en-PH" dirty="0"/>
-              <a:t>Additional implementation can be integrated to components, producing </a:t>
-            </a:r>
-            <a:r>
-              <a:rPr lang="en-PH" b="1" dirty="0"/>
-              <a:t>higher-order components</a:t>
-            </a:r>
-          </a:p>
-        </p:txBody>
-      </p:sp>
+        </p:nvPicPr>
+        <p:blipFill>
+          <a:blip r:embed="rId2"/>
+          <a:stretch>
+            <a:fillRect/>
+          </a:stretch>
+        </p:blipFill>
+        <p:spPr>
+          <a:xfrm>
+            <a:off x="627134" y="2630311"/>
+            <a:ext cx="10937732" cy="2741966"/>
+          </a:xfrm>
+          <a:prstGeom prst="rect">
+            <a:avLst/>
+          </a:prstGeom>
+        </p:spPr>
+      </p:pic>
     </p:spTree>
     <p:extLst>
       <p:ext uri="{BB962C8B-B14F-4D97-AF65-F5344CB8AC3E}">
-        <p14:creationId xmlns:p14="http://schemas.microsoft.com/office/powerpoint/2010/main" val="3595327585"/>
+        <p14:creationId xmlns:p14="http://schemas.microsoft.com/office/powerpoint/2010/main" val="2283538873"/>
       </p:ext>
     </p:extLst>
   </p:cSld>
@@ -4021,7 +4787,7 @@
           <p:cNvPr id="2" name="Title 1">
             <a:extLst>
               <a:ext uri="{FF2B5EF4-FFF2-40B4-BE49-F238E27FC236}">
-                <a16:creationId xmlns:a16="http://schemas.microsoft.com/office/drawing/2014/main" id="{13A219DF-C41A-4F1C-B8D8-0E76547B84C6}"/>
+                <a16:creationId xmlns:a16="http://schemas.microsoft.com/office/drawing/2014/main" id="{D292077E-955E-4468-96A3-267AA6C60995}"/>
               </a:ext>
             </a:extLst>
           </p:cNvPr>
@@ -4039,7 +4805,7 @@
           <a:p>
             <a:r>
               <a:rPr lang="en-PH" dirty="0"/>
-              <a:t>Props</a:t>
+              <a:t>Components</a:t>
             </a:r>
           </a:p>
         </p:txBody>
@@ -4049,7 +4815,7 @@
           <p:cNvPr id="3" name="Content Placeholder 2">
             <a:extLst>
               <a:ext uri="{FF2B5EF4-FFF2-40B4-BE49-F238E27FC236}">
-                <a16:creationId xmlns:a16="http://schemas.microsoft.com/office/drawing/2014/main" id="{7B82AD5B-612F-4AD4-8DDB-37D0A3781263}"/>
+                <a16:creationId xmlns:a16="http://schemas.microsoft.com/office/drawing/2014/main" id="{54E4191A-0622-4F0F-A220-6D6D08C56839}"/>
               </a:ext>
             </a:extLst>
           </p:cNvPr>
@@ -4067,53 +4833,59 @@
           <a:p>
             <a:r>
               <a:rPr lang="en-PH" dirty="0"/>
-              <a:t>A simple </a:t>
+              <a:t>A </a:t>
             </a:r>
             <a:r>
               <a:rPr lang="en-PH" b="1" dirty="0"/>
-              <a:t>key-value pair collection</a:t>
-            </a:r>
-          </a:p>
-          <a:p>
-            <a:r>
-              <a:rPr lang="en-PH" dirty="0"/>
-              <a:t>Passed to components/elements </a:t>
+              <a:t>container</a:t>
+            </a:r>
+            <a:r>
+              <a:rPr lang="en-PH" dirty="0"/>
+              <a:t> for passing </a:t>
             </a:r>
             <a:r>
               <a:rPr lang="en-PH" b="1" dirty="0"/>
-              <a:t>via attributes</a:t>
-            </a:r>
-          </a:p>
-          <a:p>
-            <a:r>
-              <a:rPr lang="en-PH" dirty="0"/>
-              <a:t>Note that </a:t>
+              <a:t>props</a:t>
+            </a:r>
+            <a:r>
+              <a:rPr lang="en-PH" dirty="0"/>
+              <a:t> (properties) and rendering a </a:t>
             </a:r>
             <a:r>
               <a:rPr lang="en-PH" b="1" dirty="0"/>
-              <a:t>anything inside the element </a:t>
-            </a:r>
-            <a:r>
-              <a:rPr lang="en-PH" dirty="0"/>
-              <a:t>is a </a:t>
+              <a:t>template</a:t>
+            </a:r>
+          </a:p>
+          <a:p>
+            <a:r>
+              <a:rPr lang="en-PH" dirty="0"/>
+              <a:t>Can be </a:t>
             </a:r>
             <a:r>
               <a:rPr lang="en-PH" b="1" dirty="0"/>
-              <a:t>prop</a:t>
-            </a:r>
-            <a:r>
-              <a:rPr lang="en-PH" dirty="0"/>
-              <a:t> as well (</a:t>
-            </a:r>
-            <a:r>
-              <a:rPr lang="en-PH" dirty="0" err="1">
-                <a:latin typeface="mononoki" panose="00000509000000000000" pitchFamily="49" charset="0"/>
-              </a:rPr>
-              <a:t>props.children</a:t>
-            </a:r>
-            <a:r>
-              <a:rPr lang="en-PH" dirty="0"/>
-              <a:t>)</a:t>
+              <a:t>stateless</a:t>
+            </a:r>
+            <a:r>
+              <a:rPr lang="en-PH" dirty="0"/>
+              <a:t> (simple) or </a:t>
+            </a:r>
+            <a:r>
+              <a:rPr lang="en-PH" b="1" dirty="0"/>
+              <a:t>stateful</a:t>
+            </a:r>
+            <a:r>
+              <a:rPr lang="en-PH" dirty="0"/>
+              <a:t> (with state + optional lifecycle overrides)</a:t>
+            </a:r>
+          </a:p>
+          <a:p>
+            <a:r>
+              <a:rPr lang="en-PH" dirty="0"/>
+              <a:t>Additional implementation can be integrated to components, producing </a:t>
+            </a:r>
+            <a:r>
+              <a:rPr lang="en-PH" b="1" dirty="0"/>
+              <a:t>higher-order components</a:t>
             </a:r>
           </a:p>
         </p:txBody>
@@ -4121,7 +4893,7 @@
     </p:spTree>
     <p:extLst>
       <p:ext uri="{BB962C8B-B14F-4D97-AF65-F5344CB8AC3E}">
-        <p14:creationId xmlns:p14="http://schemas.microsoft.com/office/powerpoint/2010/main" val="1757553595"/>
+        <p14:creationId xmlns:p14="http://schemas.microsoft.com/office/powerpoint/2010/main" val="3595327585"/>
       </p:ext>
     </p:extLst>
   </p:cSld>
@@ -4153,7 +4925,7 @@
           <p:cNvPr id="2" name="Title 1">
             <a:extLst>
               <a:ext uri="{FF2B5EF4-FFF2-40B4-BE49-F238E27FC236}">
-                <a16:creationId xmlns:a16="http://schemas.microsoft.com/office/drawing/2014/main" id="{DB8417E7-9CD2-4088-A7BB-B33A2B6BF6CF}"/>
+                <a16:creationId xmlns:a16="http://schemas.microsoft.com/office/drawing/2014/main" id="{13A219DF-C41A-4F1C-B8D8-0E76547B84C6}"/>
               </a:ext>
             </a:extLst>
           </p:cNvPr>
@@ -4171,7 +4943,7 @@
           <a:p>
             <a:r>
               <a:rPr lang="en-PH" dirty="0"/>
-              <a:t>State</a:t>
+              <a:t>Props</a:t>
             </a:r>
           </a:p>
         </p:txBody>
@@ -4181,7 +4953,7 @@
           <p:cNvPr id="3" name="Content Placeholder 2">
             <a:extLst>
               <a:ext uri="{FF2B5EF4-FFF2-40B4-BE49-F238E27FC236}">
-                <a16:creationId xmlns:a16="http://schemas.microsoft.com/office/drawing/2014/main" id="{42F73F46-36D0-414F-A718-95F7E8D0DF81}"/>
+                <a16:creationId xmlns:a16="http://schemas.microsoft.com/office/drawing/2014/main" id="{7B82AD5B-612F-4AD4-8DDB-37D0A3781263}"/>
               </a:ext>
             </a:extLst>
           </p:cNvPr>
@@ -4199,42 +4971,61 @@
           <a:p>
             <a:r>
               <a:rPr lang="en-PH" dirty="0"/>
-              <a:t>Same with props, but </a:t>
+              <a:t>A simple </a:t>
             </a:r>
             <a:r>
               <a:rPr lang="en-PH" b="1" dirty="0"/>
-              <a:t>internal to the component instance</a:t>
-            </a:r>
-          </a:p>
-          <a:p>
+              <a:t>key-value pair collection</a:t>
+            </a:r>
+          </a:p>
+          <a:p>
+            <a:r>
+              <a:rPr lang="en-PH" dirty="0"/>
+              <a:t>Passed to components/elements </a:t>
+            </a:r>
             <a:r>
               <a:rPr lang="en-PH" b="1" dirty="0"/>
-              <a:t>Prop changes </a:t>
-            </a:r>
-            <a:r>
-              <a:rPr lang="en-PH" dirty="0"/>
-              <a:t>may trigger </a:t>
+              <a:t>via attributes</a:t>
+            </a:r>
+          </a:p>
+          <a:p>
+            <a:r>
+              <a:rPr lang="en-PH" dirty="0"/>
+              <a:t>Note that </a:t>
             </a:r>
             <a:r>
               <a:rPr lang="en-PH" b="1" dirty="0"/>
-              <a:t>state changes</a:t>
-            </a:r>
-          </a:p>
-          <a:p>
+              <a:t>anything inside the element </a:t>
+            </a:r>
+            <a:r>
+              <a:rPr lang="en-PH" dirty="0"/>
+              <a:t>is a </a:t>
+            </a:r>
             <a:r>
               <a:rPr lang="en-PH" b="1" dirty="0"/>
-              <a:t>Optional</a:t>
-            </a:r>
-          </a:p>
-          <a:p>
-            <a:endParaRPr lang="en-PH" dirty="0"/>
+              <a:t>prop</a:t>
+            </a:r>
+            <a:r>
+              <a:rPr lang="en-PH" dirty="0"/>
+              <a:t> as well (</a:t>
+            </a:r>
+            <a:r>
+              <a:rPr lang="en-PH" dirty="0" err="1">
+                <a:latin typeface="mononoki" panose="00000509000000000000" pitchFamily="49" charset="0"/>
+              </a:rPr>
+              <a:t>props.children</a:t>
+            </a:r>
+            <a:r>
+              <a:rPr lang="en-PH" dirty="0"/>
+              <a:t>)</a:t>
+            </a:r>
           </a:p>
         </p:txBody>
       </p:sp>
     </p:spTree>
     <p:extLst>
       <p:ext uri="{BB962C8B-B14F-4D97-AF65-F5344CB8AC3E}">
-        <p14:creationId xmlns:p14="http://schemas.microsoft.com/office/powerpoint/2010/main" val="4019515958"/>
+        <p14:creationId xmlns:p14="http://schemas.microsoft.com/office/powerpoint/2010/main" val="1757553595"/>
       </p:ext>
     </p:extLst>
   </p:cSld>
@@ -4266,7 +5057,7 @@
           <p:cNvPr id="2" name="Title 1">
             <a:extLst>
               <a:ext uri="{FF2B5EF4-FFF2-40B4-BE49-F238E27FC236}">
-                <a16:creationId xmlns:a16="http://schemas.microsoft.com/office/drawing/2014/main" id="{6C9FD18A-9059-489C-9F08-7A8ED3BDCE36}"/>
+                <a16:creationId xmlns:a16="http://schemas.microsoft.com/office/drawing/2014/main" id="{DB8417E7-9CD2-4088-A7BB-B33A2B6BF6CF}"/>
               </a:ext>
             </a:extLst>
           </p:cNvPr>
@@ -4284,7 +5075,7 @@
           <a:p>
             <a:r>
               <a:rPr lang="en-PH" dirty="0"/>
-              <a:t>When Will Re-rendering Happen?</a:t>
+              <a:t>State</a:t>
             </a:r>
           </a:p>
         </p:txBody>
@@ -4294,7 +5085,7 @@
           <p:cNvPr id="3" name="Content Placeholder 2">
             <a:extLst>
               <a:ext uri="{FF2B5EF4-FFF2-40B4-BE49-F238E27FC236}">
-                <a16:creationId xmlns:a16="http://schemas.microsoft.com/office/drawing/2014/main" id="{06AB034F-8265-45AC-AE12-4A0E9C7F87EC}"/>
+                <a16:creationId xmlns:a16="http://schemas.microsoft.com/office/drawing/2014/main" id="{42F73F46-36D0-414F-A718-95F7E8D0DF81}"/>
               </a:ext>
             </a:extLst>
           </p:cNvPr>
@@ -4311,36 +5102,43 @@
           <a:lstStyle/>
           <a:p>
             <a:r>
+              <a:rPr lang="en-PH" dirty="0"/>
+              <a:t>Same with props, but </a:t>
+            </a:r>
+            <a:r>
               <a:rPr lang="en-PH" b="1" dirty="0"/>
-              <a:t>Prop changes</a:t>
+              <a:t>internal to the component instance</a:t>
             </a:r>
           </a:p>
           <a:p>
             <a:r>
               <a:rPr lang="en-PH" b="1" dirty="0"/>
-              <a:t>State changes</a:t>
-            </a:r>
-          </a:p>
-          <a:p>
-            <a:r>
-              <a:rPr lang="en-PH" dirty="0" err="1">
-                <a:latin typeface="mononoki" panose="00000509000000000000" pitchFamily="49" charset="0"/>
-              </a:rPr>
-              <a:t>forceUpdate</a:t>
-            </a:r>
-            <a:r>
-              <a:rPr lang="en-PH" dirty="0">
-                <a:latin typeface="mononoki" panose="00000509000000000000" pitchFamily="49" charset="0"/>
-              </a:rPr>
-              <a:t>()</a:t>
-            </a:r>
+              <a:t>Prop changes </a:t>
+            </a:r>
+            <a:r>
+              <a:rPr lang="en-PH" dirty="0"/>
+              <a:t>may trigger </a:t>
+            </a:r>
+            <a:r>
+              <a:rPr lang="en-PH" b="1" dirty="0"/>
+              <a:t>state changes</a:t>
+            </a:r>
+          </a:p>
+          <a:p>
+            <a:r>
+              <a:rPr lang="en-PH" b="1" dirty="0"/>
+              <a:t>Optional</a:t>
+            </a:r>
+          </a:p>
+          <a:p>
+            <a:endParaRPr lang="en-PH" dirty="0"/>
           </a:p>
         </p:txBody>
       </p:sp>
     </p:spTree>
     <p:extLst>
       <p:ext uri="{BB962C8B-B14F-4D97-AF65-F5344CB8AC3E}">
-        <p14:creationId xmlns:p14="http://schemas.microsoft.com/office/powerpoint/2010/main" val="3817960945"/>
+        <p14:creationId xmlns:p14="http://schemas.microsoft.com/office/powerpoint/2010/main" val="4019515958"/>
       </p:ext>
     </p:extLst>
   </p:cSld>
@@ -4369,10 +5167,10 @@
       </p:grpSpPr>
       <p:sp>
         <p:nvSpPr>
-          <p:cNvPr id="4" name="Title 3">
-            <a:extLst>
-              <a:ext uri="{FF2B5EF4-FFF2-40B4-BE49-F238E27FC236}">
-                <a16:creationId xmlns:a16="http://schemas.microsoft.com/office/drawing/2014/main" id="{9E2C4704-3189-40AC-8AF7-36FC7940E8DF}"/>
+          <p:cNvPr id="2" name="Title 1">
+            <a:extLst>
+              <a:ext uri="{FF2B5EF4-FFF2-40B4-BE49-F238E27FC236}">
+                <a16:creationId xmlns:a16="http://schemas.microsoft.com/office/drawing/2014/main" id="{6C9FD18A-9059-489C-9F08-7A8ED3BDCE36}"/>
               </a:ext>
             </a:extLst>
           </p:cNvPr>
@@ -4390,35 +5188,55 @@
           <a:p>
             <a:r>
               <a:rPr lang="en-PH" dirty="0"/>
-              <a:t>Warming Up</a:t>
-            </a:r>
-          </a:p>
-        </p:txBody>
-      </p:sp>
-      <p:sp>
-        <p:nvSpPr>
-          <p:cNvPr id="5" name="Text Placeholder 4">
-            <a:extLst>
-              <a:ext uri="{FF2B5EF4-FFF2-40B4-BE49-F238E27FC236}">
-                <a16:creationId xmlns:a16="http://schemas.microsoft.com/office/drawing/2014/main" id="{FAD1D955-5D51-4217-9222-4083E1FB9CDB}"/>
-              </a:ext>
-            </a:extLst>
-          </p:cNvPr>
-          <p:cNvSpPr>
-            <a:spLocks noGrp="1"/>
-          </p:cNvSpPr>
-          <p:nvPr>
-            <p:ph type="body" idx="1"/>
-          </p:nvPr>
-        </p:nvSpPr>
-        <p:spPr/>
-        <p:txBody>
-          <a:bodyPr/>
-          <a:lstStyle/>
-          <a:p>
-            <a:r>
-              <a:rPr lang="en-PH" dirty="0"/>
-              <a:t>Looking into the workings of React</a:t>
+              <a:t>When Will Re-rendering Happen?</a:t>
+            </a:r>
+          </a:p>
+        </p:txBody>
+      </p:sp>
+      <p:sp>
+        <p:nvSpPr>
+          <p:cNvPr id="3" name="Content Placeholder 2">
+            <a:extLst>
+              <a:ext uri="{FF2B5EF4-FFF2-40B4-BE49-F238E27FC236}">
+                <a16:creationId xmlns:a16="http://schemas.microsoft.com/office/drawing/2014/main" id="{06AB034F-8265-45AC-AE12-4A0E9C7F87EC}"/>
+              </a:ext>
+            </a:extLst>
+          </p:cNvPr>
+          <p:cNvSpPr>
+            <a:spLocks noGrp="1"/>
+          </p:cNvSpPr>
+          <p:nvPr>
+            <p:ph idx="1"/>
+          </p:nvPr>
+        </p:nvSpPr>
+        <p:spPr/>
+        <p:txBody>
+          <a:bodyPr/>
+          <a:lstStyle/>
+          <a:p>
+            <a:r>
+              <a:rPr lang="en-PH" b="1" dirty="0"/>
+              <a:t>Prop changes</a:t>
+            </a:r>
+          </a:p>
+          <a:p>
+            <a:r>
+              <a:rPr lang="en-PH" b="1" dirty="0"/>
+              <a:t>State changes</a:t>
+            </a:r>
+          </a:p>
+          <a:p>
+            <a:r>
+              <a:rPr lang="en-PH" dirty="0" err="1">
+                <a:latin typeface="mononoki" panose="00000509000000000000" pitchFamily="49" charset="0"/>
+              </a:rPr>
+              <a:t>forceUpdate</a:t>
+            </a:r>
+            <a:r>
+              <a:rPr lang="en-PH" dirty="0">
+                <a:latin typeface="mononoki" panose="00000509000000000000" pitchFamily="49" charset="0"/>
+              </a:rPr>
+              <a:t>()</a:t>
             </a:r>
           </a:p>
         </p:txBody>
@@ -4426,7 +5244,7 @@
     </p:spTree>
     <p:extLst>
       <p:ext uri="{BB962C8B-B14F-4D97-AF65-F5344CB8AC3E}">
-        <p14:creationId xmlns:p14="http://schemas.microsoft.com/office/powerpoint/2010/main" val="735606892"/>
+        <p14:creationId xmlns:p14="http://schemas.microsoft.com/office/powerpoint/2010/main" val="3817960945"/>
       </p:ext>
     </p:extLst>
   </p:cSld>
@@ -4458,7 +5276,7 @@
           <p:cNvPr id="4" name="Title 3">
             <a:extLst>
               <a:ext uri="{FF2B5EF4-FFF2-40B4-BE49-F238E27FC236}">
-                <a16:creationId xmlns:a16="http://schemas.microsoft.com/office/drawing/2014/main" id="{913681B0-D2F4-4B71-92BF-D6699EF9B641}"/>
+                <a16:creationId xmlns:a16="http://schemas.microsoft.com/office/drawing/2014/main" id="{9E2C4704-3189-40AC-8AF7-36FC7940E8DF}"/>
               </a:ext>
             </a:extLst>
           </p:cNvPr>
@@ -4476,67 +5294,35 @@
           <a:p>
             <a:r>
               <a:rPr lang="en-PH" dirty="0"/>
-              <a:t>What Constitutes a Component?</a:t>
-            </a:r>
-          </a:p>
-        </p:txBody>
-      </p:sp>
-      <p:sp>
-        <p:nvSpPr>
-          <p:cNvPr id="5" name="Content Placeholder 4">
-            <a:extLst>
-              <a:ext uri="{FF2B5EF4-FFF2-40B4-BE49-F238E27FC236}">
-                <a16:creationId xmlns:a16="http://schemas.microsoft.com/office/drawing/2014/main" id="{39178EF2-8C3C-45E7-9ED5-B5805CA98A11}"/>
-              </a:ext>
-            </a:extLst>
-          </p:cNvPr>
-          <p:cNvSpPr>
-            <a:spLocks noGrp="1"/>
-          </p:cNvSpPr>
-          <p:nvPr>
-            <p:ph idx="1"/>
-          </p:nvPr>
-        </p:nvSpPr>
-        <p:spPr/>
-        <p:txBody>
-          <a:bodyPr/>
-          <a:lstStyle/>
-          <a:p>
-            <a:r>
-              <a:rPr lang="en-PH" dirty="0"/>
-              <a:t>If there needs to have a certain </a:t>
-            </a:r>
-            <a:r>
-              <a:rPr lang="en-PH" b="1" dirty="0"/>
-              <a:t>structure</a:t>
-            </a:r>
-            <a:r>
-              <a:rPr lang="en-PH" dirty="0"/>
-              <a:t> in the rendered </a:t>
-            </a:r>
-            <a:r>
-              <a:rPr lang="en-PH" b="1" dirty="0"/>
-              <a:t>template</a:t>
-            </a:r>
-          </a:p>
-          <a:p>
-            <a:r>
-              <a:rPr lang="en-PH" dirty="0"/>
-              <a:t>If it’s possible to </a:t>
-            </a:r>
-            <a:r>
-              <a:rPr lang="en-PH" b="1" dirty="0"/>
-              <a:t>contain a behavior</a:t>
-            </a:r>
-          </a:p>
-          <a:p>
-            <a:r>
-              <a:rPr lang="en-PH" dirty="0"/>
-              <a:t>If it can </a:t>
-            </a:r>
-            <a:r>
-              <a:rPr lang="en-PH" b="1" dirty="0"/>
-              <a:t>stand alone</a:t>
+              <a:t>Warming Up</a:t>
+            </a:r>
+          </a:p>
+        </p:txBody>
+      </p:sp>
+      <p:sp>
+        <p:nvSpPr>
+          <p:cNvPr id="5" name="Text Placeholder 4">
+            <a:extLst>
+              <a:ext uri="{FF2B5EF4-FFF2-40B4-BE49-F238E27FC236}">
+                <a16:creationId xmlns:a16="http://schemas.microsoft.com/office/drawing/2014/main" id="{FAD1D955-5D51-4217-9222-4083E1FB9CDB}"/>
+              </a:ext>
+            </a:extLst>
+          </p:cNvPr>
+          <p:cNvSpPr>
+            <a:spLocks noGrp="1"/>
+          </p:cNvSpPr>
+          <p:nvPr>
+            <p:ph type="body" idx="1"/>
+          </p:nvPr>
+        </p:nvSpPr>
+        <p:spPr/>
+        <p:txBody>
+          <a:bodyPr/>
+          <a:lstStyle/>
+          <a:p>
+            <a:r>
+              <a:rPr lang="en-PH" dirty="0"/>
+              <a:t>Looking into the workings of React</a:t>
             </a:r>
           </a:p>
         </p:txBody>
@@ -4544,7 +5330,7 @@
     </p:spTree>
     <p:extLst>
       <p:ext uri="{BB962C8B-B14F-4D97-AF65-F5344CB8AC3E}">
-        <p14:creationId xmlns:p14="http://schemas.microsoft.com/office/powerpoint/2010/main" val="2085132401"/>
+        <p14:creationId xmlns:p14="http://schemas.microsoft.com/office/powerpoint/2010/main" val="735606892"/>
       </p:ext>
     </p:extLst>
   </p:cSld>
@@ -4576,7 +5362,7 @@
           <p:cNvPr id="4" name="Title 3">
             <a:extLst>
               <a:ext uri="{FF2B5EF4-FFF2-40B4-BE49-F238E27FC236}">
-                <a16:creationId xmlns:a16="http://schemas.microsoft.com/office/drawing/2014/main" id="{3BB1D2FB-EBAC-413A-98E6-0EE4CE655F89}"/>
+                <a16:creationId xmlns:a16="http://schemas.microsoft.com/office/drawing/2014/main" id="{913681B0-D2F4-4B71-92BF-D6699EF9B641}"/>
               </a:ext>
             </a:extLst>
           </p:cNvPr>
@@ -4593,12 +5379,8 @@
           <a:lstStyle/>
           <a:p>
             <a:r>
-              <a:rPr lang="en-PH" dirty="0" err="1"/>
-              <a:t>StateLess</a:t>
-            </a:r>
-            <a:r>
-              <a:rPr lang="en-PH" dirty="0"/>
-              <a:t> Components</a:t>
+              <a:rPr lang="en-PH" dirty="0"/>
+              <a:t>What Constitutes a Component?</a:t>
             </a:r>
           </a:p>
         </p:txBody>
@@ -4608,7 +5390,7 @@
           <p:cNvPr id="5" name="Content Placeholder 4">
             <a:extLst>
               <a:ext uri="{FF2B5EF4-FFF2-40B4-BE49-F238E27FC236}">
-                <a16:creationId xmlns:a16="http://schemas.microsoft.com/office/drawing/2014/main" id="{46BBA10A-36B7-4930-9FA1-18B03173A499}"/>
+                <a16:creationId xmlns:a16="http://schemas.microsoft.com/office/drawing/2014/main" id="{39178EF2-8C3C-45E7-9ED5-B5805CA98A11}"/>
               </a:ext>
             </a:extLst>
           </p:cNvPr>
@@ -4626,31 +5408,39 @@
           <a:p>
             <a:r>
               <a:rPr lang="en-PH" dirty="0"/>
-              <a:t>Uses </a:t>
+              <a:t>If there needs to have a certain </a:t>
             </a:r>
             <a:r>
               <a:rPr lang="en-PH" b="1" dirty="0"/>
-              <a:t>function syntax</a:t>
-            </a:r>
-          </a:p>
-          <a:p>
-            <a:r>
-              <a:rPr lang="en-PH" dirty="0"/>
-              <a:t>Simple mapping of </a:t>
+              <a:t>structure</a:t>
+            </a:r>
+            <a:r>
+              <a:rPr lang="en-PH" dirty="0"/>
+              <a:t> in the rendered </a:t>
             </a:r>
             <a:r>
               <a:rPr lang="en-PH" b="1" dirty="0"/>
-              <a:t>props to templates</a:t>
-            </a:r>
-          </a:p>
-          <a:p>
+              <a:t>template</a:t>
+            </a:r>
+          </a:p>
+          <a:p>
+            <a:r>
+              <a:rPr lang="en-PH" dirty="0"/>
+              <a:t>If it’s possible to </a:t>
+            </a:r>
             <a:r>
               <a:rPr lang="en-PH" b="1" dirty="0"/>
-              <a:t>No lifecycle method </a:t>
-            </a:r>
-            <a:r>
-              <a:rPr lang="en-PH" dirty="0"/>
-              <a:t>overriding</a:t>
+              <a:t>contain a behavior</a:t>
+            </a:r>
+          </a:p>
+          <a:p>
+            <a:r>
+              <a:rPr lang="en-PH" dirty="0"/>
+              <a:t>If it can </a:t>
+            </a:r>
+            <a:r>
+              <a:rPr lang="en-PH" b="1" dirty="0"/>
+              <a:t>stand alone</a:t>
             </a:r>
           </a:p>
         </p:txBody>
@@ -4658,7 +5448,7 @@
     </p:spTree>
     <p:extLst>
       <p:ext uri="{BB962C8B-B14F-4D97-AF65-F5344CB8AC3E}">
-        <p14:creationId xmlns:p14="http://schemas.microsoft.com/office/powerpoint/2010/main" val="1037891427"/>
+        <p14:creationId xmlns:p14="http://schemas.microsoft.com/office/powerpoint/2010/main" val="2085132401"/>
       </p:ext>
     </p:extLst>
   </p:cSld>
@@ -4687,10 +5477,10 @@
       </p:grpSpPr>
       <p:sp>
         <p:nvSpPr>
-          <p:cNvPr id="2" name="Title 1">
-            <a:extLst>
-              <a:ext uri="{FF2B5EF4-FFF2-40B4-BE49-F238E27FC236}">
-                <a16:creationId xmlns:a16="http://schemas.microsoft.com/office/drawing/2014/main" id="{5D545099-2CB0-4039-93B0-2AB5FD81E3EF}"/>
+          <p:cNvPr id="4" name="Title 3">
+            <a:extLst>
+              <a:ext uri="{FF2B5EF4-FFF2-40B4-BE49-F238E27FC236}">
+                <a16:creationId xmlns:a16="http://schemas.microsoft.com/office/drawing/2014/main" id="{3BB1D2FB-EBAC-413A-98E6-0EE4CE655F89}"/>
               </a:ext>
             </a:extLst>
           </p:cNvPr>
@@ -4708,17 +5498,17 @@
           <a:p>
             <a:r>
               <a:rPr lang="en-PH" dirty="0"/>
-              <a:t>Stateful Components</a:t>
-            </a:r>
-          </a:p>
-        </p:txBody>
-      </p:sp>
-      <p:sp>
-        <p:nvSpPr>
-          <p:cNvPr id="3" name="Content Placeholder 2">
-            <a:extLst>
-              <a:ext uri="{FF2B5EF4-FFF2-40B4-BE49-F238E27FC236}">
-                <a16:creationId xmlns:a16="http://schemas.microsoft.com/office/drawing/2014/main" id="{4F9381CA-58B9-4A5A-9FC7-FDE204DC3093}"/>
+              <a:t>Stateless Components</a:t>
+            </a:r>
+          </a:p>
+        </p:txBody>
+      </p:sp>
+      <p:sp>
+        <p:nvSpPr>
+          <p:cNvPr id="5" name="Content Placeholder 4">
+            <a:extLst>
+              <a:ext uri="{FF2B5EF4-FFF2-40B4-BE49-F238E27FC236}">
+                <a16:creationId xmlns:a16="http://schemas.microsoft.com/office/drawing/2014/main" id="{46BBA10A-36B7-4930-9FA1-18B03173A499}"/>
               </a:ext>
             </a:extLst>
           </p:cNvPr>
@@ -4740,38 +5530,35 @@
             </a:r>
             <a:r>
               <a:rPr lang="en-PH" b="1" dirty="0"/>
-              <a:t>class syntax</a:t>
-            </a:r>
-          </a:p>
-          <a:p>
-            <a:r>
-              <a:rPr lang="en-PH" dirty="0"/>
-              <a:t>Added capability of </a:t>
+              <a:t>function syntax</a:t>
+            </a:r>
+          </a:p>
+          <a:p>
+            <a:r>
+              <a:rPr lang="en-PH" dirty="0"/>
+              <a:t>Simple mapping of </a:t>
             </a:r>
             <a:r>
               <a:rPr lang="en-PH" b="1" dirty="0"/>
-              <a:t>storing internal state</a:t>
+              <a:t>props to templates</a:t>
             </a:r>
           </a:p>
           <a:p>
             <a:r>
               <a:rPr lang="en-PH" b="1" dirty="0"/>
-              <a:t>Lifecycle method </a:t>
+              <a:t>No lifecycle method </a:t>
             </a:r>
             <a:r>
               <a:rPr lang="en-PH" dirty="0"/>
               <a:t>overriding</a:t>
             </a:r>
-          </a:p>
-          <a:p>
-            <a:endParaRPr lang="en-PH" dirty="0"/>
           </a:p>
         </p:txBody>
       </p:sp>
     </p:spTree>
     <p:extLst>
       <p:ext uri="{BB962C8B-B14F-4D97-AF65-F5344CB8AC3E}">
-        <p14:creationId xmlns:p14="http://schemas.microsoft.com/office/powerpoint/2010/main" val="246499448"/>
+        <p14:creationId xmlns:p14="http://schemas.microsoft.com/office/powerpoint/2010/main" val="1037891427"/>
       </p:ext>
     </p:extLst>
   </p:cSld>
@@ -4803,7 +5590,7 @@
           <p:cNvPr id="2" name="Title 1">
             <a:extLst>
               <a:ext uri="{FF2B5EF4-FFF2-40B4-BE49-F238E27FC236}">
-                <a16:creationId xmlns:a16="http://schemas.microsoft.com/office/drawing/2014/main" id="{8DF6A139-FA9C-4DC4-9EA7-E6BD5AF67BE6}"/>
+                <a16:creationId xmlns:a16="http://schemas.microsoft.com/office/drawing/2014/main" id="{5D545099-2CB0-4039-93B0-2AB5FD81E3EF}"/>
               </a:ext>
             </a:extLst>
           </p:cNvPr>
@@ -4821,7 +5608,7 @@
           <a:p>
             <a:r>
               <a:rPr lang="en-PH" dirty="0"/>
-              <a:t>Higher-order Components</a:t>
+              <a:t>Stateful Components</a:t>
             </a:r>
           </a:p>
         </p:txBody>
@@ -4831,7 +5618,7 @@
           <p:cNvPr id="3" name="Content Placeholder 2">
             <a:extLst>
               <a:ext uri="{FF2B5EF4-FFF2-40B4-BE49-F238E27FC236}">
-                <a16:creationId xmlns:a16="http://schemas.microsoft.com/office/drawing/2014/main" id="{B403CF99-1E84-4730-8C94-DD4784C1BA8E}"/>
+                <a16:creationId xmlns:a16="http://schemas.microsoft.com/office/drawing/2014/main" id="{4F9381CA-58B9-4A5A-9FC7-FDE204DC3093}"/>
               </a:ext>
             </a:extLst>
           </p:cNvPr>
@@ -4849,47 +5636,42 @@
           <a:p>
             <a:r>
               <a:rPr lang="en-PH" dirty="0"/>
-              <a:t>Components with </a:t>
+              <a:t>Uses </a:t>
             </a:r>
             <a:r>
               <a:rPr lang="en-PH" b="1" dirty="0"/>
-              <a:t>added functionality</a:t>
-            </a:r>
-          </a:p>
-          <a:p>
-            <a:r>
-              <a:rPr lang="en-PH" dirty="0"/>
-              <a:t>Produced by inserting the component into a </a:t>
+              <a:t>class syntax</a:t>
+            </a:r>
+          </a:p>
+          <a:p>
+            <a:r>
+              <a:rPr lang="en-PH" dirty="0"/>
+              <a:t>Added capability of </a:t>
             </a:r>
             <a:r>
               <a:rPr lang="en-PH" b="1" dirty="0"/>
-              <a:t>function returning another component</a:t>
-            </a:r>
-          </a:p>
-          <a:p>
-            <a:r>
-              <a:rPr lang="en-PH" dirty="0"/>
-              <a:t>You can put a </a:t>
-            </a:r>
+              <a:t>storing internal state</a:t>
+            </a:r>
+          </a:p>
+          <a:p>
             <a:r>
               <a:rPr lang="en-PH" b="1" dirty="0"/>
-              <a:t>higher-order component </a:t>
-            </a:r>
-            <a:r>
-              <a:rPr lang="en-PH" dirty="0"/>
-              <a:t>into </a:t>
-            </a:r>
-            <a:r>
-              <a:rPr lang="en-PH" b="1" dirty="0"/>
-              <a:t>another function</a:t>
-            </a:r>
+              <a:t>Lifecycle method </a:t>
+            </a:r>
+            <a:r>
+              <a:rPr lang="en-PH" dirty="0"/>
+              <a:t>overriding</a:t>
+            </a:r>
+          </a:p>
+          <a:p>
+            <a:endParaRPr lang="en-PH" dirty="0"/>
           </a:p>
         </p:txBody>
       </p:sp>
     </p:spTree>
     <p:extLst>
       <p:ext uri="{BB962C8B-B14F-4D97-AF65-F5344CB8AC3E}">
-        <p14:creationId xmlns:p14="http://schemas.microsoft.com/office/powerpoint/2010/main" val="715867954"/>
+        <p14:creationId xmlns:p14="http://schemas.microsoft.com/office/powerpoint/2010/main" val="246499448"/>
       </p:ext>
     </p:extLst>
   </p:cSld>
@@ -4918,10 +5700,10 @@
       </p:grpSpPr>
       <p:sp>
         <p:nvSpPr>
-          <p:cNvPr id="4" name="Title 3">
-            <a:extLst>
-              <a:ext uri="{FF2B5EF4-FFF2-40B4-BE49-F238E27FC236}">
-                <a16:creationId xmlns:a16="http://schemas.microsoft.com/office/drawing/2014/main" id="{33B60E03-86DD-47D5-B10A-7BBE6AD94FA4}"/>
+          <p:cNvPr id="2" name="Title 1">
+            <a:extLst>
+              <a:ext uri="{FF2B5EF4-FFF2-40B4-BE49-F238E27FC236}">
+                <a16:creationId xmlns:a16="http://schemas.microsoft.com/office/drawing/2014/main" id="{8DF6A139-FA9C-4DC4-9EA7-E6BD5AF67BE6}"/>
               </a:ext>
             </a:extLst>
           </p:cNvPr>
@@ -4939,35 +5721,67 @@
           <a:p>
             <a:r>
               <a:rPr lang="en-PH" dirty="0"/>
-              <a:t>What’s Next?</a:t>
-            </a:r>
-          </a:p>
-        </p:txBody>
-      </p:sp>
-      <p:sp>
-        <p:nvSpPr>
-          <p:cNvPr id="5" name="Text Placeholder 4">
-            <a:extLst>
-              <a:ext uri="{FF2B5EF4-FFF2-40B4-BE49-F238E27FC236}">
-                <a16:creationId xmlns:a16="http://schemas.microsoft.com/office/drawing/2014/main" id="{F04AB262-5A94-43ED-B44A-AB254F2DEEA5}"/>
-              </a:ext>
-            </a:extLst>
-          </p:cNvPr>
-          <p:cNvSpPr>
-            <a:spLocks noGrp="1"/>
-          </p:cNvSpPr>
-          <p:nvPr>
-            <p:ph type="body" idx="1"/>
-          </p:nvPr>
-        </p:nvSpPr>
-        <p:spPr/>
-        <p:txBody>
-          <a:bodyPr/>
-          <a:lstStyle/>
-          <a:p>
-            <a:r>
-              <a:rPr lang="en-PH" dirty="0"/>
-              <a:t>Additional resources for deeper understanding</a:t>
+              <a:t>Higher-order Components</a:t>
+            </a:r>
+          </a:p>
+        </p:txBody>
+      </p:sp>
+      <p:sp>
+        <p:nvSpPr>
+          <p:cNvPr id="3" name="Content Placeholder 2">
+            <a:extLst>
+              <a:ext uri="{FF2B5EF4-FFF2-40B4-BE49-F238E27FC236}">
+                <a16:creationId xmlns:a16="http://schemas.microsoft.com/office/drawing/2014/main" id="{B403CF99-1E84-4730-8C94-DD4784C1BA8E}"/>
+              </a:ext>
+            </a:extLst>
+          </p:cNvPr>
+          <p:cNvSpPr>
+            <a:spLocks noGrp="1"/>
+          </p:cNvSpPr>
+          <p:nvPr>
+            <p:ph idx="1"/>
+          </p:nvPr>
+        </p:nvSpPr>
+        <p:spPr/>
+        <p:txBody>
+          <a:bodyPr/>
+          <a:lstStyle/>
+          <a:p>
+            <a:r>
+              <a:rPr lang="en-PH" dirty="0"/>
+              <a:t>Components with </a:t>
+            </a:r>
+            <a:r>
+              <a:rPr lang="en-PH" b="1" dirty="0"/>
+              <a:t>added functionality</a:t>
+            </a:r>
+          </a:p>
+          <a:p>
+            <a:r>
+              <a:rPr lang="en-PH" dirty="0"/>
+              <a:t>Produced by inserting the component into a </a:t>
+            </a:r>
+            <a:r>
+              <a:rPr lang="en-PH" b="1" dirty="0"/>
+              <a:t>function returning another component</a:t>
+            </a:r>
+          </a:p>
+          <a:p>
+            <a:r>
+              <a:rPr lang="en-PH" dirty="0"/>
+              <a:t>You can put a </a:t>
+            </a:r>
+            <a:r>
+              <a:rPr lang="en-PH" b="1" dirty="0"/>
+              <a:t>higher-order component </a:t>
+            </a:r>
+            <a:r>
+              <a:rPr lang="en-PH" dirty="0"/>
+              <a:t>into </a:t>
+            </a:r>
+            <a:r>
+              <a:rPr lang="en-PH" b="1" dirty="0"/>
+              <a:t>another function</a:t>
             </a:r>
           </a:p>
         </p:txBody>
@@ -4975,7 +5789,7 @@
     </p:spTree>
     <p:extLst>
       <p:ext uri="{BB962C8B-B14F-4D97-AF65-F5344CB8AC3E}">
-        <p14:creationId xmlns:p14="http://schemas.microsoft.com/office/powerpoint/2010/main" val="3397646994"/>
+        <p14:creationId xmlns:p14="http://schemas.microsoft.com/office/powerpoint/2010/main" val="715867954"/>
       </p:ext>
     </p:extLst>
   </p:cSld>
@@ -5002,106 +5816,46 @@
           <a:chExt cx="0" cy="0"/>
         </a:xfrm>
       </p:grpSpPr>
-      <p:sp>
-        <p:nvSpPr>
-          <p:cNvPr id="2" name="Title 1">
-            <a:extLst>
-              <a:ext uri="{FF2B5EF4-FFF2-40B4-BE49-F238E27FC236}">
-                <a16:creationId xmlns:a16="http://schemas.microsoft.com/office/drawing/2014/main" id="{4CA005D3-89B0-4EB5-BED4-85821B2B366B}"/>
-              </a:ext>
-            </a:extLst>
-          </p:cNvPr>
-          <p:cNvSpPr>
-            <a:spLocks noGrp="1"/>
-          </p:cNvSpPr>
-          <p:nvPr>
-            <p:ph type="title"/>
-          </p:nvPr>
-        </p:nvSpPr>
-        <p:spPr/>
-        <p:txBody>
-          <a:bodyPr/>
-          <a:lstStyle/>
-          <a:p>
-            <a:r>
-              <a:rPr lang="en-PH" dirty="0"/>
-              <a:t>The Framework</a:t>
-            </a:r>
-          </a:p>
-        </p:txBody>
-      </p:sp>
-      <p:sp>
-        <p:nvSpPr>
-          <p:cNvPr id="3" name="Content Placeholder 2">
-            <a:extLst>
-              <a:ext uri="{FF2B5EF4-FFF2-40B4-BE49-F238E27FC236}">
-                <a16:creationId xmlns:a16="http://schemas.microsoft.com/office/drawing/2014/main" id="{E4D466B2-A83B-42C3-88A9-7401DB8E2524}"/>
-              </a:ext>
-            </a:extLst>
-          </p:cNvPr>
-          <p:cNvSpPr>
-            <a:spLocks noGrp="1"/>
-          </p:cNvSpPr>
-          <p:nvPr>
-            <p:ph idx="1"/>
-          </p:nvPr>
-        </p:nvSpPr>
-        <p:spPr/>
-        <p:txBody>
-          <a:bodyPr/>
-          <a:lstStyle/>
-          <a:p>
-            <a:r>
-              <a:rPr lang="en-PH" dirty="0"/>
-              <a:t>Made in </a:t>
-            </a:r>
-            <a:r>
-              <a:rPr lang="en-PH" b="1" dirty="0"/>
-              <a:t>March 2013</a:t>
-            </a:r>
-            <a:r>
-              <a:rPr lang="en-PH" dirty="0"/>
-              <a:t> by </a:t>
-            </a:r>
-            <a:r>
-              <a:rPr lang="en-PH" b="1" dirty="0"/>
-              <a:t>Facebook</a:t>
-            </a:r>
-          </a:p>
-          <a:p>
-            <a:r>
-              <a:rPr lang="en-PH" dirty="0"/>
-              <a:t>Licensed under </a:t>
-            </a:r>
-            <a:r>
-              <a:rPr lang="en-PH" b="1" dirty="0"/>
-              <a:t>BSD + Patents</a:t>
-            </a:r>
-            <a:r>
-              <a:rPr lang="en-PH" dirty="0"/>
-              <a:t>, but changed to </a:t>
-            </a:r>
-            <a:r>
-              <a:rPr lang="en-PH" b="1" dirty="0"/>
-              <a:t>MIT</a:t>
-            </a:r>
-          </a:p>
-          <a:p>
-            <a:r>
-              <a:rPr lang="en-PH" b="1" dirty="0"/>
-              <a:t>112M</a:t>
-            </a:r>
-            <a:r>
-              <a:rPr lang="en-PH" dirty="0"/>
-              <a:t> total downloads since its inception (as of April 2018)</a:t>
-            </a:r>
-          </a:p>
-        </p:txBody>
-      </p:sp>
+      <p:pic>
+        <p:nvPicPr>
+          <p:cNvPr id="7" name="Picture 6">
+            <a:extLst>
+              <a:ext uri="{FF2B5EF4-FFF2-40B4-BE49-F238E27FC236}">
+                <a16:creationId xmlns:a16="http://schemas.microsoft.com/office/drawing/2014/main" id="{1B578BD8-7858-4835-8BD5-50BB2857DD82}"/>
+              </a:ext>
+            </a:extLst>
+          </p:cNvPr>
+          <p:cNvPicPr>
+            <a:picLocks noChangeAspect="1"/>
+          </p:cNvPicPr>
+          <p:nvPr/>
+        </p:nvPicPr>
+        <p:blipFill>
+          <a:blip r:embed="rId3">
+            <a:extLst>
+              <a:ext uri="{28A0092B-C50C-407E-A947-70E740481C1C}">
+                <a14:useLocalDpi xmlns:a14="http://schemas.microsoft.com/office/drawing/2010/main" val="0"/>
+              </a:ext>
+            </a:extLst>
+          </a:blip>
+          <a:stretch>
+            <a:fillRect/>
+          </a:stretch>
+        </p:blipFill>
+        <p:spPr>
+          <a:xfrm>
+            <a:off x="2923822" y="185803"/>
+            <a:ext cx="6344356" cy="6486394"/>
+          </a:xfrm>
+          <a:prstGeom prst="rect">
+            <a:avLst/>
+          </a:prstGeom>
+        </p:spPr>
+      </p:pic>
     </p:spTree>
     <p:extLst>
       <p:ext uri="{BB962C8B-B14F-4D97-AF65-F5344CB8AC3E}">
-        <p14:creationId xmlns:p14="http://schemas.microsoft.com/office/powerpoint/2010/main" val="3883524235"/>
+        <p14:creationId xmlns:p14="http://schemas.microsoft.com/office/powerpoint/2010/main" val="3561255422"/>
       </p:ext>
     </p:extLst>
   </p:cSld>
@@ -5128,110 +5882,159 @@
           <a:chExt cx="0" cy="0"/>
         </a:xfrm>
       </p:grpSpPr>
-      <p:sp>
-        <p:nvSpPr>
-          <p:cNvPr id="4" name="Title 3">
-            <a:extLst>
-              <a:ext uri="{FF2B5EF4-FFF2-40B4-BE49-F238E27FC236}">
-                <a16:creationId xmlns:a16="http://schemas.microsoft.com/office/drawing/2014/main" id="{1A153E26-6CEF-4CC7-AB86-2E7DC667D8EC}"/>
-              </a:ext>
-            </a:extLst>
-          </p:cNvPr>
-          <p:cNvSpPr>
-            <a:spLocks noGrp="1"/>
-          </p:cNvSpPr>
-          <p:nvPr>
-            <p:ph type="title"/>
-          </p:nvPr>
-        </p:nvSpPr>
-        <p:spPr/>
-        <p:txBody>
-          <a:bodyPr/>
-          <a:lstStyle/>
-          <a:p>
-            <a:r>
-              <a:rPr lang="en-PH" dirty="0"/>
-              <a:t>Where are the references?</a:t>
-            </a:r>
-          </a:p>
-        </p:txBody>
-      </p:sp>
-      <p:sp>
-        <p:nvSpPr>
-          <p:cNvPr id="5" name="Content Placeholder 4">
-            <a:extLst>
-              <a:ext uri="{FF2B5EF4-FFF2-40B4-BE49-F238E27FC236}">
-                <a16:creationId xmlns:a16="http://schemas.microsoft.com/office/drawing/2014/main" id="{C4276B88-ECB9-4CCD-8D5E-B8619D3AFCC5}"/>
-              </a:ext>
-            </a:extLst>
-          </p:cNvPr>
-          <p:cNvSpPr>
-            <a:spLocks noGrp="1"/>
-          </p:cNvSpPr>
-          <p:nvPr>
-            <p:ph idx="1"/>
-          </p:nvPr>
-        </p:nvSpPr>
-        <p:spPr/>
-        <p:txBody>
-          <a:bodyPr>
-            <a:normAutofit fontScale="92500" lnSpcReduction="10000"/>
-          </a:bodyPr>
-          <a:lstStyle/>
-          <a:p>
-            <a:r>
-              <a:rPr lang="en-PH" dirty="0"/>
-              <a:t>In my GitHub (</a:t>
-            </a:r>
-            <a:r>
-              <a:rPr lang="en-PH" dirty="0">
-                <a:latin typeface="mononoki" panose="00000509000000000000" pitchFamily="49" charset="0"/>
-              </a:rPr>
-              <a:t>https://github.com/Temoto-kun/react-workshop-2018</a:t>
-            </a:r>
-            <a:r>
-              <a:rPr lang="en-PH" dirty="0"/>
-              <a:t>)</a:t>
-            </a:r>
-          </a:p>
-          <a:p>
-            <a:r>
-              <a:rPr lang="en-PH" dirty="0"/>
-              <a:t>You can access the demos at (</a:t>
-            </a:r>
-            <a:r>
-              <a:rPr lang="en-PH" dirty="0">
-                <a:latin typeface="mononoki" panose="00000509000000000000" pitchFamily="49" charset="0"/>
-              </a:rPr>
-              <a:t>https://Temoto-kun.github.io/react-workshop-2018/</a:t>
-            </a:r>
-            <a:r>
-              <a:rPr lang="en-PH" dirty="0"/>
-              <a:t>)</a:t>
-            </a:r>
-          </a:p>
-          <a:p>
-            <a:r>
-              <a:rPr lang="en-PH" dirty="0"/>
-              <a:t>The slides are included in the repo, and is accessible in the online site as well (</a:t>
-            </a:r>
-            <a:r>
-              <a:rPr lang="en-PH" dirty="0">
-                <a:latin typeface="mononoki" panose="00000509000000000000" pitchFamily="49" charset="0"/>
-              </a:rPr>
-              <a:t>https://Temoto-kun.github.io/react-workshop-2018/React.js.pptx</a:t>
-            </a:r>
-            <a:r>
-              <a:rPr lang="en-PH" dirty="0"/>
-              <a:t>)</a:t>
-            </a:r>
-          </a:p>
-        </p:txBody>
-      </p:sp>
+      <p:grpSp>
+        <p:nvGrpSpPr>
+          <p:cNvPr id="8" name="Group 7">
+            <a:extLst>
+              <a:ext uri="{FF2B5EF4-FFF2-40B4-BE49-F238E27FC236}">
+                <a16:creationId xmlns:a16="http://schemas.microsoft.com/office/drawing/2014/main" id="{1D2FE8EC-0FF7-49A0-B138-DC92A26287A8}"/>
+              </a:ext>
+            </a:extLst>
+          </p:cNvPr>
+          <p:cNvGrpSpPr/>
+          <p:nvPr/>
+        </p:nvGrpSpPr>
+        <p:grpSpPr>
+          <a:xfrm>
+            <a:off x="1371600" y="374650"/>
+            <a:ext cx="9448800" cy="6108700"/>
+            <a:chOff x="1371600" y="374650"/>
+            <a:chExt cx="9448800" cy="6108700"/>
+          </a:xfrm>
+        </p:grpSpPr>
+        <p:pic>
+          <p:nvPicPr>
+            <p:cNvPr id="5" name="Picture 4">
+              <a:extLst>
+                <a:ext uri="{FF2B5EF4-FFF2-40B4-BE49-F238E27FC236}">
+                  <a16:creationId xmlns:a16="http://schemas.microsoft.com/office/drawing/2014/main" id="{7BD6CE6C-E5DE-4886-9096-832F27911E59}"/>
+                </a:ext>
+              </a:extLst>
+            </p:cNvPr>
+            <p:cNvPicPr>
+              <a:picLocks noChangeAspect="1"/>
+            </p:cNvPicPr>
+            <p:nvPr/>
+          </p:nvPicPr>
+          <p:blipFill>
+            <a:blip r:embed="rId2">
+              <a:extLst>
+                <a:ext uri="{28A0092B-C50C-407E-A947-70E740481C1C}">
+                  <a14:useLocalDpi xmlns:a14="http://schemas.microsoft.com/office/drawing/2010/main" val="0"/>
+                </a:ext>
+              </a:extLst>
+            </a:blip>
+            <a:stretch>
+              <a:fillRect/>
+            </a:stretch>
+          </p:blipFill>
+          <p:spPr>
+            <a:xfrm>
+              <a:off x="1371600" y="374650"/>
+              <a:ext cx="9448800" cy="6108700"/>
+            </a:xfrm>
+            <a:prstGeom prst="rect">
+              <a:avLst/>
+            </a:prstGeom>
+          </p:spPr>
+        </p:pic>
+        <p:sp>
+          <p:nvSpPr>
+            <p:cNvPr id="6" name="TextBox 5">
+              <a:extLst>
+                <a:ext uri="{FF2B5EF4-FFF2-40B4-BE49-F238E27FC236}">
+                  <a16:creationId xmlns:a16="http://schemas.microsoft.com/office/drawing/2014/main" id="{63B76E70-DDBD-4AD9-9E43-6CB537FF6BC4}"/>
+                </a:ext>
+              </a:extLst>
+            </p:cNvPr>
+            <p:cNvSpPr txBox="1"/>
+            <p:nvPr/>
+          </p:nvSpPr>
+          <p:spPr>
+            <a:xfrm>
+              <a:off x="3364089" y="699911"/>
+              <a:ext cx="5407378" cy="1446550"/>
+            </a:xfrm>
+            <a:prstGeom prst="rect">
+              <a:avLst/>
+            </a:prstGeom>
+            <a:noFill/>
+          </p:spPr>
+          <p:txBody>
+            <a:bodyPr wrap="square" rtlCol="0">
+              <a:spAutoFit/>
+            </a:bodyPr>
+            <a:lstStyle/>
+            <a:p>
+              <a:pPr algn="ctr"/>
+              <a:r>
+                <a:rPr lang="en-PH" sz="8800" dirty="0">
+                  <a:ln w="38100">
+                    <a:solidFill>
+                      <a:schemeClr val="tx1"/>
+                    </a:solidFill>
+                  </a:ln>
+                  <a:solidFill>
+                    <a:schemeClr val="bg1"/>
+                  </a:solidFill>
+                  <a:latin typeface="+mj-lt"/>
+                </a:rPr>
+                <a:t>YO DAWG</a:t>
+              </a:r>
+            </a:p>
+          </p:txBody>
+        </p:sp>
+        <p:sp>
+          <p:nvSpPr>
+            <p:cNvPr id="7" name="TextBox 6">
+              <a:extLst>
+                <a:ext uri="{FF2B5EF4-FFF2-40B4-BE49-F238E27FC236}">
+                  <a16:creationId xmlns:a16="http://schemas.microsoft.com/office/drawing/2014/main" id="{8E8C8630-433B-4484-B47A-55FF0EEB592B}"/>
+                </a:ext>
+              </a:extLst>
+            </p:cNvPr>
+            <p:cNvSpPr txBox="1"/>
+            <p:nvPr/>
+          </p:nvSpPr>
+          <p:spPr>
+            <a:xfrm>
+              <a:off x="1749778" y="4711539"/>
+              <a:ext cx="8692444" cy="1200329"/>
+            </a:xfrm>
+            <a:prstGeom prst="rect">
+              <a:avLst/>
+            </a:prstGeom>
+            <a:noFill/>
+          </p:spPr>
+          <p:txBody>
+            <a:bodyPr wrap="square" rtlCol="0">
+              <a:spAutoFit/>
+            </a:bodyPr>
+            <a:lstStyle/>
+            <a:p>
+              <a:pPr algn="ctr"/>
+              <a:r>
+                <a:rPr lang="en-PH" sz="7200" dirty="0">
+                  <a:ln w="38100">
+                    <a:solidFill>
+                      <a:schemeClr val="tx1"/>
+                    </a:solidFill>
+                  </a:ln>
+                  <a:solidFill>
+                    <a:schemeClr val="bg1"/>
+                  </a:solidFill>
+                  <a:latin typeface="+mj-lt"/>
+                </a:rPr>
+                <a:t>I HEARD YOU LIKE FUNCTIONS</a:t>
+              </a:r>
+            </a:p>
+          </p:txBody>
+        </p:sp>
+      </p:grpSp>
     </p:spTree>
     <p:extLst>
       <p:ext uri="{BB962C8B-B14F-4D97-AF65-F5344CB8AC3E}">
-        <p14:creationId xmlns:p14="http://schemas.microsoft.com/office/powerpoint/2010/main" val="661219411"/>
+        <p14:creationId xmlns:p14="http://schemas.microsoft.com/office/powerpoint/2010/main" val="1191926626"/>
       </p:ext>
     </p:extLst>
   </p:cSld>
@@ -5260,10 +6063,10 @@
       </p:grpSpPr>
       <p:sp>
         <p:nvSpPr>
-          <p:cNvPr id="4" name="Title 3">
-            <a:extLst>
-              <a:ext uri="{FF2B5EF4-FFF2-40B4-BE49-F238E27FC236}">
-                <a16:creationId xmlns:a16="http://schemas.microsoft.com/office/drawing/2014/main" id="{08431FB2-7F70-4C51-BD87-6E106DBEEDE0}"/>
+          <p:cNvPr id="2" name="Title 1">
+            <a:extLst>
+              <a:ext uri="{FF2B5EF4-FFF2-40B4-BE49-F238E27FC236}">
+                <a16:creationId xmlns:a16="http://schemas.microsoft.com/office/drawing/2014/main" id="{8DF6A139-FA9C-4DC4-9EA7-E6BD5AF67BE6}"/>
               </a:ext>
             </a:extLst>
           </p:cNvPr>
@@ -5281,17 +6084,17 @@
           <a:p>
             <a:r>
               <a:rPr lang="en-PH" dirty="0"/>
-              <a:t>Libraries</a:t>
-            </a:r>
-          </a:p>
-        </p:txBody>
-      </p:sp>
-      <p:sp>
-        <p:nvSpPr>
-          <p:cNvPr id="5" name="Content Placeholder 4">
-            <a:extLst>
-              <a:ext uri="{FF2B5EF4-FFF2-40B4-BE49-F238E27FC236}">
-                <a16:creationId xmlns:a16="http://schemas.microsoft.com/office/drawing/2014/main" id="{59DE3A42-86A2-4862-869F-37B07F41B5B4}"/>
+              <a:t>Higher-order Components</a:t>
+            </a:r>
+          </a:p>
+        </p:txBody>
+      </p:sp>
+      <p:sp>
+        <p:nvSpPr>
+          <p:cNvPr id="3" name="Content Placeholder 2">
+            <a:extLst>
+              <a:ext uri="{FF2B5EF4-FFF2-40B4-BE49-F238E27FC236}">
+                <a16:creationId xmlns:a16="http://schemas.microsoft.com/office/drawing/2014/main" id="{B403CF99-1E84-4730-8C94-DD4784C1BA8E}"/>
               </a:ext>
             </a:extLst>
           </p:cNvPr>
@@ -5308,57 +6111,40 @@
           <a:lstStyle/>
           <a:p>
             <a:r>
-              <a:rPr lang="en-PH" dirty="0">
-                <a:latin typeface="mononoki" panose="00000509000000000000" pitchFamily="49" charset="0"/>
-              </a:rPr>
-              <a:t>create-react-app</a:t>
-            </a:r>
-            <a:r>
-              <a:rPr lang="en-PH" dirty="0"/>
-              <a:t> generator library (maintained by Facebook)</a:t>
-            </a:r>
-          </a:p>
-          <a:p>
+              <a:rPr lang="en-PH" dirty="0"/>
+              <a:t>Components with </a:t>
+            </a:r>
             <a:r>
               <a:rPr lang="en-PH" b="1" dirty="0"/>
-              <a:t>Redux</a:t>
-            </a:r>
-            <a:r>
-              <a:rPr lang="en-PH" dirty="0"/>
-              <a:t> + other middleware (for managing state)</a:t>
-            </a:r>
-          </a:p>
-          <a:p>
-            <a:r>
-              <a:rPr lang="en-PH" dirty="0">
-                <a:latin typeface="mononoki" panose="00000509000000000000" pitchFamily="49" charset="0"/>
-              </a:rPr>
-              <a:t>prop-types</a:t>
-            </a:r>
-            <a:r>
-              <a:rPr lang="en-PH" dirty="0"/>
-              <a:t> (for declaring </a:t>
+              <a:t>added functionality</a:t>
+            </a:r>
+          </a:p>
+          <a:p>
+            <a:r>
+              <a:rPr lang="en-PH" dirty="0"/>
+              <a:t>Produced by inserting the component into a </a:t>
             </a:r>
             <a:r>
               <a:rPr lang="en-PH" b="1" dirty="0"/>
-              <a:t>props</a:t>
-            </a:r>
-            <a:r>
-              <a:rPr lang="en-PH" dirty="0"/>
-              <a:t>)</a:t>
-            </a:r>
-          </a:p>
-          <a:p>
-            <a:r>
-              <a:rPr lang="en-PH" b="1" dirty="0" err="1"/>
-              <a:t>ESLint</a:t>
-            </a:r>
-            <a:endParaRPr lang="en-PH" b="1" dirty="0"/>
-          </a:p>
-          <a:p>
+              <a:t>function returning another component</a:t>
+            </a:r>
+          </a:p>
+          <a:p>
+            <a:r>
+              <a:rPr lang="en-PH" dirty="0"/>
+              <a:t>You can put a </a:t>
+            </a:r>
             <a:r>
               <a:rPr lang="en-PH" b="1" dirty="0"/>
-              <a:t>Flow</a:t>
+              <a:t>higher-order component </a:t>
+            </a:r>
+            <a:r>
+              <a:rPr lang="en-PH" dirty="0"/>
+              <a:t>into </a:t>
+            </a:r>
+            <a:r>
+              <a:rPr lang="en-PH" b="1" dirty="0"/>
+              <a:t>another function</a:t>
             </a:r>
           </a:p>
         </p:txBody>
@@ -5366,7 +6152,7 @@
     </p:spTree>
     <p:extLst>
       <p:ext uri="{BB962C8B-B14F-4D97-AF65-F5344CB8AC3E}">
-        <p14:creationId xmlns:p14="http://schemas.microsoft.com/office/powerpoint/2010/main" val="281968758"/>
+        <p14:creationId xmlns:p14="http://schemas.microsoft.com/office/powerpoint/2010/main" val="917158017"/>
       </p:ext>
     </p:extLst>
   </p:cSld>
@@ -5393,94 +6179,45 @@
           <a:chExt cx="0" cy="0"/>
         </a:xfrm>
       </p:grpSpPr>
-      <p:sp>
-        <p:nvSpPr>
-          <p:cNvPr id="2" name="Title 1">
-            <a:extLst>
-              <a:ext uri="{FF2B5EF4-FFF2-40B4-BE49-F238E27FC236}">
-                <a16:creationId xmlns:a16="http://schemas.microsoft.com/office/drawing/2014/main" id="{8FD7490F-AC6F-4ECC-826D-48811AF8C3FD}"/>
-              </a:ext>
-            </a:extLst>
-          </p:cNvPr>
-          <p:cNvSpPr>
-            <a:spLocks noGrp="1"/>
-          </p:cNvSpPr>
-          <p:nvPr>
-            <p:ph type="title"/>
-          </p:nvPr>
-        </p:nvSpPr>
-        <p:spPr/>
-        <p:txBody>
-          <a:bodyPr/>
-          <a:lstStyle/>
-          <a:p>
-            <a:r>
-              <a:rPr lang="en-PH" dirty="0"/>
-              <a:t>We’re Hiring!</a:t>
-            </a:r>
-          </a:p>
-        </p:txBody>
-      </p:sp>
-      <p:sp>
-        <p:nvSpPr>
-          <p:cNvPr id="3" name="Content Placeholder 2">
-            <a:extLst>
-              <a:ext uri="{FF2B5EF4-FFF2-40B4-BE49-F238E27FC236}">
-                <a16:creationId xmlns:a16="http://schemas.microsoft.com/office/drawing/2014/main" id="{0FA35810-3B8A-4378-9DDB-30F818B0B77B}"/>
-              </a:ext>
-            </a:extLst>
-          </p:cNvPr>
-          <p:cNvSpPr>
-            <a:spLocks noGrp="1"/>
-          </p:cNvSpPr>
-          <p:nvPr>
-            <p:ph idx="1"/>
-          </p:nvPr>
-        </p:nvSpPr>
-        <p:spPr/>
-        <p:txBody>
-          <a:bodyPr/>
-          <a:lstStyle/>
-          <a:p>
-            <a:r>
-              <a:rPr lang="en-PH" dirty="0"/>
-              <a:t>Shoot me an email </a:t>
-            </a:r>
-            <a:r>
-              <a:rPr lang="en-PH" dirty="0">
-                <a:latin typeface="mononoki" panose="00000509000000000000" pitchFamily="49" charset="0"/>
-              </a:rPr>
-              <a:t>allan.crisostomo@whitecloak.com</a:t>
-            </a:r>
-          </a:p>
-          <a:p>
-            <a:r>
-              <a:rPr lang="en-PH" dirty="0"/>
-              <a:t>Add subject line </a:t>
-            </a:r>
-            <a:r>
-              <a:rPr lang="en-PH" dirty="0">
-                <a:latin typeface="mononoki" panose="00000509000000000000" pitchFamily="49" charset="0"/>
-              </a:rPr>
-              <a:t>[APPLICATION] (Position Desired)</a:t>
-            </a:r>
-          </a:p>
-          <a:p>
-            <a:r>
-              <a:rPr lang="en-PH" dirty="0"/>
-              <a:t>Will contact you </a:t>
-            </a:r>
-            <a:r>
-              <a:rPr lang="en-PH" b="1" dirty="0"/>
-              <a:t>as soon as the application is received</a:t>
-            </a:r>
-          </a:p>
-        </p:txBody>
-      </p:sp>
+      <p:pic>
+        <p:nvPicPr>
+          <p:cNvPr id="3" name="Picture 2">
+            <a:extLst>
+              <a:ext uri="{FF2B5EF4-FFF2-40B4-BE49-F238E27FC236}">
+                <a16:creationId xmlns:a16="http://schemas.microsoft.com/office/drawing/2014/main" id="{4A55A9A2-A210-473A-B621-D59F92CB50EB}"/>
+              </a:ext>
+            </a:extLst>
+          </p:cNvPr>
+          <p:cNvPicPr>
+            <a:picLocks noChangeAspect="1"/>
+          </p:cNvPicPr>
+          <p:nvPr/>
+        </p:nvPicPr>
+        <p:blipFill rotWithShape="1">
+          <a:blip r:embed="rId2">
+            <a:extLst>
+              <a:ext uri="{28A0092B-C50C-407E-A947-70E740481C1C}">
+                <a14:useLocalDpi xmlns:a14="http://schemas.microsoft.com/office/drawing/2010/main" val="0"/>
+              </a:ext>
+            </a:extLst>
+          </a:blip>
+          <a:srcRect b="5795"/>
+          <a:stretch/>
+        </p:blipFill>
+        <p:spPr>
+          <a:xfrm>
+            <a:off x="2286000" y="659342"/>
+            <a:ext cx="7620000" cy="5539317"/>
+          </a:xfrm>
+          <a:prstGeom prst="rect">
+            <a:avLst/>
+          </a:prstGeom>
+        </p:spPr>
+      </p:pic>
     </p:spTree>
     <p:extLst>
       <p:ext uri="{BB962C8B-B14F-4D97-AF65-F5344CB8AC3E}">
-        <p14:creationId xmlns:p14="http://schemas.microsoft.com/office/powerpoint/2010/main" val="273986908"/>
+        <p14:creationId xmlns:p14="http://schemas.microsoft.com/office/powerpoint/2010/main" val="2429972606"/>
       </p:ext>
     </p:extLst>
   </p:cSld>
@@ -5509,6 +6246,471 @@
       </p:grpSpPr>
       <p:sp>
         <p:nvSpPr>
+          <p:cNvPr id="4" name="Title 3">
+            <a:extLst>
+              <a:ext uri="{FF2B5EF4-FFF2-40B4-BE49-F238E27FC236}">
+                <a16:creationId xmlns:a16="http://schemas.microsoft.com/office/drawing/2014/main" id="{33B60E03-86DD-47D5-B10A-7BBE6AD94FA4}"/>
+              </a:ext>
+            </a:extLst>
+          </p:cNvPr>
+          <p:cNvSpPr>
+            <a:spLocks noGrp="1"/>
+          </p:cNvSpPr>
+          <p:nvPr>
+            <p:ph type="title"/>
+          </p:nvPr>
+        </p:nvSpPr>
+        <p:spPr/>
+        <p:txBody>
+          <a:bodyPr/>
+          <a:lstStyle/>
+          <a:p>
+            <a:r>
+              <a:rPr lang="en-PH" dirty="0"/>
+              <a:t>What’s Next?</a:t>
+            </a:r>
+          </a:p>
+        </p:txBody>
+      </p:sp>
+      <p:sp>
+        <p:nvSpPr>
+          <p:cNvPr id="5" name="Text Placeholder 4">
+            <a:extLst>
+              <a:ext uri="{FF2B5EF4-FFF2-40B4-BE49-F238E27FC236}">
+                <a16:creationId xmlns:a16="http://schemas.microsoft.com/office/drawing/2014/main" id="{F04AB262-5A94-43ED-B44A-AB254F2DEEA5}"/>
+              </a:ext>
+            </a:extLst>
+          </p:cNvPr>
+          <p:cNvSpPr>
+            <a:spLocks noGrp="1"/>
+          </p:cNvSpPr>
+          <p:nvPr>
+            <p:ph type="body" idx="1"/>
+          </p:nvPr>
+        </p:nvSpPr>
+        <p:spPr/>
+        <p:txBody>
+          <a:bodyPr/>
+          <a:lstStyle/>
+          <a:p>
+            <a:r>
+              <a:rPr lang="en-PH" dirty="0"/>
+              <a:t>Additional resources for deeper understanding</a:t>
+            </a:r>
+          </a:p>
+        </p:txBody>
+      </p:sp>
+    </p:spTree>
+    <p:extLst>
+      <p:ext uri="{BB962C8B-B14F-4D97-AF65-F5344CB8AC3E}">
+        <p14:creationId xmlns:p14="http://schemas.microsoft.com/office/powerpoint/2010/main" val="3397646994"/>
+      </p:ext>
+    </p:extLst>
+  </p:cSld>
+  <p:clrMapOvr>
+    <a:masterClrMapping/>
+  </p:clrMapOvr>
+</p:sld>
+</file>
+
+<file path=ppt/slides/slide24.xml><?xml version="1.0" encoding="utf-8"?>
+<p:sld xmlns:a="http://schemas.openxmlformats.org/drawingml/2006/main" xmlns:r="http://schemas.openxmlformats.org/officeDocument/2006/relationships" xmlns:p="http://schemas.openxmlformats.org/presentationml/2006/main">
+  <p:cSld>
+    <p:spTree>
+      <p:nvGrpSpPr>
+        <p:cNvPr id="1" name=""/>
+        <p:cNvGrpSpPr/>
+        <p:nvPr/>
+      </p:nvGrpSpPr>
+      <p:grpSpPr>
+        <a:xfrm>
+          <a:off x="0" y="0"/>
+          <a:ext cx="0" cy="0"/>
+          <a:chOff x="0" y="0"/>
+          <a:chExt cx="0" cy="0"/>
+        </a:xfrm>
+      </p:grpSpPr>
+      <p:sp>
+        <p:nvSpPr>
+          <p:cNvPr id="4" name="Title 3">
+            <a:extLst>
+              <a:ext uri="{FF2B5EF4-FFF2-40B4-BE49-F238E27FC236}">
+                <a16:creationId xmlns:a16="http://schemas.microsoft.com/office/drawing/2014/main" id="{1A153E26-6CEF-4CC7-AB86-2E7DC667D8EC}"/>
+              </a:ext>
+            </a:extLst>
+          </p:cNvPr>
+          <p:cNvSpPr>
+            <a:spLocks noGrp="1"/>
+          </p:cNvSpPr>
+          <p:nvPr>
+            <p:ph type="title"/>
+          </p:nvPr>
+        </p:nvSpPr>
+        <p:spPr/>
+        <p:txBody>
+          <a:bodyPr/>
+          <a:lstStyle/>
+          <a:p>
+            <a:r>
+              <a:rPr lang="en-PH" dirty="0"/>
+              <a:t>Where are the references?</a:t>
+            </a:r>
+          </a:p>
+        </p:txBody>
+      </p:sp>
+      <p:sp>
+        <p:nvSpPr>
+          <p:cNvPr id="5" name="Content Placeholder 4">
+            <a:extLst>
+              <a:ext uri="{FF2B5EF4-FFF2-40B4-BE49-F238E27FC236}">
+                <a16:creationId xmlns:a16="http://schemas.microsoft.com/office/drawing/2014/main" id="{C4276B88-ECB9-4CCD-8D5E-B8619D3AFCC5}"/>
+              </a:ext>
+            </a:extLst>
+          </p:cNvPr>
+          <p:cNvSpPr>
+            <a:spLocks noGrp="1"/>
+          </p:cNvSpPr>
+          <p:nvPr>
+            <p:ph idx="1"/>
+          </p:nvPr>
+        </p:nvSpPr>
+        <p:spPr/>
+        <p:txBody>
+          <a:bodyPr>
+            <a:normAutofit fontScale="92500" lnSpcReduction="10000"/>
+          </a:bodyPr>
+          <a:lstStyle/>
+          <a:p>
+            <a:r>
+              <a:rPr lang="en-PH" dirty="0"/>
+              <a:t>In my GitHub (</a:t>
+            </a:r>
+            <a:r>
+              <a:rPr lang="en-PH" dirty="0">
+                <a:latin typeface="mononoki" panose="00000509000000000000" pitchFamily="49" charset="0"/>
+              </a:rPr>
+              <a:t>https://github.com/Temoto-kun/react-workshop-2018</a:t>
+            </a:r>
+            <a:r>
+              <a:rPr lang="en-PH" dirty="0"/>
+              <a:t>)</a:t>
+            </a:r>
+          </a:p>
+          <a:p>
+            <a:r>
+              <a:rPr lang="en-PH" dirty="0"/>
+              <a:t>You can access the demos at (</a:t>
+            </a:r>
+            <a:r>
+              <a:rPr lang="en-PH" dirty="0">
+                <a:latin typeface="mononoki" panose="00000509000000000000" pitchFamily="49" charset="0"/>
+              </a:rPr>
+              <a:t>https://Temoto-kun.github.io/react-workshop-2018/</a:t>
+            </a:r>
+            <a:r>
+              <a:rPr lang="en-PH" dirty="0"/>
+              <a:t>)</a:t>
+            </a:r>
+          </a:p>
+          <a:p>
+            <a:r>
+              <a:rPr lang="en-PH" dirty="0"/>
+              <a:t>The slides are included in the repo, and is accessible in the online site as well (</a:t>
+            </a:r>
+            <a:r>
+              <a:rPr lang="en-PH" dirty="0">
+                <a:latin typeface="mononoki" panose="00000509000000000000" pitchFamily="49" charset="0"/>
+              </a:rPr>
+              <a:t>https://Temoto-kun.github.io/react-workshop-2018/React.js.pptx</a:t>
+            </a:r>
+            <a:r>
+              <a:rPr lang="en-PH" dirty="0"/>
+              <a:t>)</a:t>
+            </a:r>
+          </a:p>
+        </p:txBody>
+      </p:sp>
+    </p:spTree>
+    <p:extLst>
+      <p:ext uri="{BB962C8B-B14F-4D97-AF65-F5344CB8AC3E}">
+        <p14:creationId xmlns:p14="http://schemas.microsoft.com/office/powerpoint/2010/main" val="661219411"/>
+      </p:ext>
+    </p:extLst>
+  </p:cSld>
+  <p:clrMapOvr>
+    <a:masterClrMapping/>
+  </p:clrMapOvr>
+</p:sld>
+</file>
+
+<file path=ppt/slides/slide25.xml><?xml version="1.0" encoding="utf-8"?>
+<p:sld xmlns:a="http://schemas.openxmlformats.org/drawingml/2006/main" xmlns:r="http://schemas.openxmlformats.org/officeDocument/2006/relationships" xmlns:p="http://schemas.openxmlformats.org/presentationml/2006/main">
+  <p:cSld>
+    <p:spTree>
+      <p:nvGrpSpPr>
+        <p:cNvPr id="1" name=""/>
+        <p:cNvGrpSpPr/>
+        <p:nvPr/>
+      </p:nvGrpSpPr>
+      <p:grpSpPr>
+        <a:xfrm>
+          <a:off x="0" y="0"/>
+          <a:ext cx="0" cy="0"/>
+          <a:chOff x="0" y="0"/>
+          <a:chExt cx="0" cy="0"/>
+        </a:xfrm>
+      </p:grpSpPr>
+      <p:sp>
+        <p:nvSpPr>
+          <p:cNvPr id="4" name="Title 3">
+            <a:extLst>
+              <a:ext uri="{FF2B5EF4-FFF2-40B4-BE49-F238E27FC236}">
+                <a16:creationId xmlns:a16="http://schemas.microsoft.com/office/drawing/2014/main" id="{08431FB2-7F70-4C51-BD87-6E106DBEEDE0}"/>
+              </a:ext>
+            </a:extLst>
+          </p:cNvPr>
+          <p:cNvSpPr>
+            <a:spLocks noGrp="1"/>
+          </p:cNvSpPr>
+          <p:nvPr>
+            <p:ph type="title"/>
+          </p:nvPr>
+        </p:nvSpPr>
+        <p:spPr/>
+        <p:txBody>
+          <a:bodyPr/>
+          <a:lstStyle/>
+          <a:p>
+            <a:r>
+              <a:rPr lang="en-PH" dirty="0"/>
+              <a:t>Libraries</a:t>
+            </a:r>
+          </a:p>
+        </p:txBody>
+      </p:sp>
+      <p:sp>
+        <p:nvSpPr>
+          <p:cNvPr id="5" name="Content Placeholder 4">
+            <a:extLst>
+              <a:ext uri="{FF2B5EF4-FFF2-40B4-BE49-F238E27FC236}">
+                <a16:creationId xmlns:a16="http://schemas.microsoft.com/office/drawing/2014/main" id="{59DE3A42-86A2-4862-869F-37B07F41B5B4}"/>
+              </a:ext>
+            </a:extLst>
+          </p:cNvPr>
+          <p:cNvSpPr>
+            <a:spLocks noGrp="1"/>
+          </p:cNvSpPr>
+          <p:nvPr>
+            <p:ph idx="1"/>
+          </p:nvPr>
+        </p:nvSpPr>
+        <p:spPr/>
+        <p:txBody>
+          <a:bodyPr/>
+          <a:lstStyle/>
+          <a:p>
+            <a:r>
+              <a:rPr lang="en-PH" dirty="0">
+                <a:latin typeface="mononoki" panose="00000509000000000000" pitchFamily="49" charset="0"/>
+              </a:rPr>
+              <a:t>create-react-app</a:t>
+            </a:r>
+            <a:r>
+              <a:rPr lang="en-PH" dirty="0"/>
+              <a:t> generator library (maintained by Facebook)</a:t>
+            </a:r>
+          </a:p>
+          <a:p>
+            <a:r>
+              <a:rPr lang="en-PH" b="1" dirty="0"/>
+              <a:t>Redux</a:t>
+            </a:r>
+            <a:r>
+              <a:rPr lang="en-PH" dirty="0"/>
+              <a:t> + other middleware (for managing state)</a:t>
+            </a:r>
+          </a:p>
+          <a:p>
+            <a:r>
+              <a:rPr lang="en-PH" dirty="0">
+                <a:latin typeface="mononoki" panose="00000509000000000000" pitchFamily="49" charset="0"/>
+              </a:rPr>
+              <a:t>prop-types</a:t>
+            </a:r>
+            <a:r>
+              <a:rPr lang="en-PH" dirty="0"/>
+              <a:t> (for declaring </a:t>
+            </a:r>
+            <a:r>
+              <a:rPr lang="en-PH" b="1" dirty="0"/>
+              <a:t>props</a:t>
+            </a:r>
+            <a:r>
+              <a:rPr lang="en-PH" dirty="0"/>
+              <a:t>)</a:t>
+            </a:r>
+          </a:p>
+          <a:p>
+            <a:r>
+              <a:rPr lang="en-PH" b="1" dirty="0" err="1"/>
+              <a:t>ESLint</a:t>
+            </a:r>
+            <a:endParaRPr lang="en-PH" b="1" dirty="0"/>
+          </a:p>
+          <a:p>
+            <a:r>
+              <a:rPr lang="en-PH" b="1" dirty="0"/>
+              <a:t>Flow</a:t>
+            </a:r>
+          </a:p>
+        </p:txBody>
+      </p:sp>
+    </p:spTree>
+    <p:extLst>
+      <p:ext uri="{BB962C8B-B14F-4D97-AF65-F5344CB8AC3E}">
+        <p14:creationId xmlns:p14="http://schemas.microsoft.com/office/powerpoint/2010/main" val="281968758"/>
+      </p:ext>
+    </p:extLst>
+  </p:cSld>
+  <p:clrMapOvr>
+    <a:masterClrMapping/>
+  </p:clrMapOvr>
+</p:sld>
+</file>
+
+<file path=ppt/slides/slide26.xml><?xml version="1.0" encoding="utf-8"?>
+<p:sld xmlns:a="http://schemas.openxmlformats.org/drawingml/2006/main" xmlns:r="http://schemas.openxmlformats.org/officeDocument/2006/relationships" xmlns:p="http://schemas.openxmlformats.org/presentationml/2006/main">
+  <p:cSld>
+    <p:spTree>
+      <p:nvGrpSpPr>
+        <p:cNvPr id="1" name=""/>
+        <p:cNvGrpSpPr/>
+        <p:nvPr/>
+      </p:nvGrpSpPr>
+      <p:grpSpPr>
+        <a:xfrm>
+          <a:off x="0" y="0"/>
+          <a:ext cx="0" cy="0"/>
+          <a:chOff x="0" y="0"/>
+          <a:chExt cx="0" cy="0"/>
+        </a:xfrm>
+      </p:grpSpPr>
+      <p:sp>
+        <p:nvSpPr>
+          <p:cNvPr id="2" name="Title 1">
+            <a:extLst>
+              <a:ext uri="{FF2B5EF4-FFF2-40B4-BE49-F238E27FC236}">
+                <a16:creationId xmlns:a16="http://schemas.microsoft.com/office/drawing/2014/main" id="{8FD7490F-AC6F-4ECC-826D-48811AF8C3FD}"/>
+              </a:ext>
+            </a:extLst>
+          </p:cNvPr>
+          <p:cNvSpPr>
+            <a:spLocks noGrp="1"/>
+          </p:cNvSpPr>
+          <p:nvPr>
+            <p:ph type="title"/>
+          </p:nvPr>
+        </p:nvSpPr>
+        <p:spPr/>
+        <p:txBody>
+          <a:bodyPr/>
+          <a:lstStyle/>
+          <a:p>
+            <a:r>
+              <a:rPr lang="en-PH" dirty="0"/>
+              <a:t>We’re Hiring!</a:t>
+            </a:r>
+          </a:p>
+        </p:txBody>
+      </p:sp>
+      <p:sp>
+        <p:nvSpPr>
+          <p:cNvPr id="3" name="Content Placeholder 2">
+            <a:extLst>
+              <a:ext uri="{FF2B5EF4-FFF2-40B4-BE49-F238E27FC236}">
+                <a16:creationId xmlns:a16="http://schemas.microsoft.com/office/drawing/2014/main" id="{0FA35810-3B8A-4378-9DDB-30F818B0B77B}"/>
+              </a:ext>
+            </a:extLst>
+          </p:cNvPr>
+          <p:cNvSpPr>
+            <a:spLocks noGrp="1"/>
+          </p:cNvSpPr>
+          <p:nvPr>
+            <p:ph idx="1"/>
+          </p:nvPr>
+        </p:nvSpPr>
+        <p:spPr/>
+        <p:txBody>
+          <a:bodyPr/>
+          <a:lstStyle/>
+          <a:p>
+            <a:r>
+              <a:rPr lang="en-PH" dirty="0"/>
+              <a:t>Shoot me an email at </a:t>
+            </a:r>
+            <a:r>
+              <a:rPr lang="en-PH" dirty="0">
+                <a:latin typeface="mononoki" panose="00000509000000000000" pitchFamily="49" charset="0"/>
+              </a:rPr>
+              <a:t>allan.crisostomo@whitecloak.com</a:t>
+            </a:r>
+          </a:p>
+          <a:p>
+            <a:r>
+              <a:rPr lang="en-PH" dirty="0"/>
+              <a:t>Add subject line </a:t>
+            </a:r>
+            <a:r>
+              <a:rPr lang="en-PH" dirty="0">
+                <a:latin typeface="mononoki" panose="00000509000000000000" pitchFamily="49" charset="0"/>
+              </a:rPr>
+              <a:t>[APPLICATION] (Position Desired)</a:t>
+            </a:r>
+          </a:p>
+          <a:p>
+            <a:r>
+              <a:rPr lang="en-PH" dirty="0"/>
+              <a:t>Will contact you </a:t>
+            </a:r>
+            <a:r>
+              <a:rPr lang="en-PH" b="1" dirty="0"/>
+              <a:t>as soon as the application is received</a:t>
+            </a:r>
+          </a:p>
+        </p:txBody>
+      </p:sp>
+    </p:spTree>
+    <p:extLst>
+      <p:ext uri="{BB962C8B-B14F-4D97-AF65-F5344CB8AC3E}">
+        <p14:creationId xmlns:p14="http://schemas.microsoft.com/office/powerpoint/2010/main" val="273986908"/>
+      </p:ext>
+    </p:extLst>
+  </p:cSld>
+  <p:clrMapOvr>
+    <a:masterClrMapping/>
+  </p:clrMapOvr>
+</p:sld>
+</file>
+
+<file path=ppt/slides/slide27.xml><?xml version="1.0" encoding="utf-8"?>
+<p:sld xmlns:a="http://schemas.openxmlformats.org/drawingml/2006/main" xmlns:r="http://schemas.openxmlformats.org/officeDocument/2006/relationships" xmlns:p="http://schemas.openxmlformats.org/presentationml/2006/main">
+  <p:cSld>
+    <p:spTree>
+      <p:nvGrpSpPr>
+        <p:cNvPr id="1" name=""/>
+        <p:cNvGrpSpPr/>
+        <p:nvPr/>
+      </p:nvGrpSpPr>
+      <p:grpSpPr>
+        <a:xfrm>
+          <a:off x="0" y="0"/>
+          <a:ext cx="0" cy="0"/>
+          <a:chOff x="0" y="0"/>
+          <a:chExt cx="0" cy="0"/>
+        </a:xfrm>
+      </p:grpSpPr>
+      <p:sp>
+        <p:nvSpPr>
           <p:cNvPr id="2" name="Title 1">
             <a:extLst>
               <a:ext uri="{FF2B5EF4-FFF2-40B4-BE49-F238E27FC236}">
@@ -5579,6 +6781,92 @@
     <p:extLst>
       <p:ext uri="{BB962C8B-B14F-4D97-AF65-F5344CB8AC3E}">
         <p14:creationId xmlns:p14="http://schemas.microsoft.com/office/powerpoint/2010/main" val="697785793"/>
+      </p:ext>
+    </p:extLst>
+  </p:cSld>
+  <p:clrMapOvr>
+    <a:masterClrMapping/>
+  </p:clrMapOvr>
+</p:sld>
+</file>
+
+<file path=ppt/slides/slide28.xml><?xml version="1.0" encoding="utf-8"?>
+<p:sld xmlns:a="http://schemas.openxmlformats.org/drawingml/2006/main" xmlns:r="http://schemas.openxmlformats.org/officeDocument/2006/relationships" xmlns:p="http://schemas.openxmlformats.org/presentationml/2006/main">
+  <p:cSld>
+    <p:spTree>
+      <p:nvGrpSpPr>
+        <p:cNvPr id="1" name=""/>
+        <p:cNvGrpSpPr/>
+        <p:nvPr/>
+      </p:nvGrpSpPr>
+      <p:grpSpPr>
+        <a:xfrm>
+          <a:off x="0" y="0"/>
+          <a:ext cx="0" cy="0"/>
+          <a:chOff x="0" y="0"/>
+          <a:chExt cx="0" cy="0"/>
+        </a:xfrm>
+      </p:grpSpPr>
+      <p:sp>
+        <p:nvSpPr>
+          <p:cNvPr id="4" name="Title 3">
+            <a:extLst>
+              <a:ext uri="{FF2B5EF4-FFF2-40B4-BE49-F238E27FC236}">
+                <a16:creationId xmlns:a16="http://schemas.microsoft.com/office/drawing/2014/main" id="{6C2C6DF9-C4D3-4FD7-B83F-469EE5AA74CA}"/>
+              </a:ext>
+            </a:extLst>
+          </p:cNvPr>
+          <p:cNvSpPr>
+            <a:spLocks noGrp="1"/>
+          </p:cNvSpPr>
+          <p:nvPr>
+            <p:ph type="ctrTitle"/>
+          </p:nvPr>
+        </p:nvSpPr>
+        <p:spPr/>
+        <p:txBody>
+          <a:bodyPr/>
+          <a:lstStyle/>
+          <a:p>
+            <a:r>
+              <a:rPr lang="en-PH" dirty="0"/>
+              <a:t>Thank You!</a:t>
+            </a:r>
+          </a:p>
+        </p:txBody>
+      </p:sp>
+      <p:sp>
+        <p:nvSpPr>
+          <p:cNvPr id="5" name="Subtitle 4">
+            <a:extLst>
+              <a:ext uri="{FF2B5EF4-FFF2-40B4-BE49-F238E27FC236}">
+                <a16:creationId xmlns:a16="http://schemas.microsoft.com/office/drawing/2014/main" id="{24171EF1-2A83-420F-B54B-E4723266FE52}"/>
+              </a:ext>
+            </a:extLst>
+          </p:cNvPr>
+          <p:cNvSpPr>
+            <a:spLocks noGrp="1"/>
+          </p:cNvSpPr>
+          <p:nvPr>
+            <p:ph type="subTitle" idx="1"/>
+          </p:nvPr>
+        </p:nvSpPr>
+        <p:spPr/>
+        <p:txBody>
+          <a:bodyPr/>
+          <a:lstStyle/>
+          <a:p>
+            <a:r>
+              <a:rPr lang="en-PH" dirty="0"/>
+              <a:t>Hack on!</a:t>
+            </a:r>
+          </a:p>
+        </p:txBody>
+      </p:sp>
+    </p:spTree>
+    <p:extLst>
+      <p:ext uri="{BB962C8B-B14F-4D97-AF65-F5344CB8AC3E}">
+        <p14:creationId xmlns:p14="http://schemas.microsoft.com/office/powerpoint/2010/main" val="3846439603"/>
       </p:ext>
     </p:extLst>
   </p:cSld>
@@ -5610,7 +6898,7 @@
           <p:cNvPr id="2" name="Title 1">
             <a:extLst>
               <a:ext uri="{FF2B5EF4-FFF2-40B4-BE49-F238E27FC236}">
-                <a16:creationId xmlns:a16="http://schemas.microsoft.com/office/drawing/2014/main" id="{5C0791EA-B3F7-4E99-A948-0683A5AF9F9C}"/>
+                <a16:creationId xmlns:a16="http://schemas.microsoft.com/office/drawing/2014/main" id="{4CA005D3-89B0-4EB5-BED4-85821B2B366B}"/>
               </a:ext>
             </a:extLst>
           </p:cNvPr>
@@ -5628,7 +6916,7 @@
           <a:p>
             <a:r>
               <a:rPr lang="en-PH" dirty="0"/>
-              <a:t>The Purpose</a:t>
+              <a:t>The Framework</a:t>
             </a:r>
           </a:p>
         </p:txBody>
@@ -5638,7 +6926,7 @@
           <p:cNvPr id="3" name="Content Placeholder 2">
             <a:extLst>
               <a:ext uri="{FF2B5EF4-FFF2-40B4-BE49-F238E27FC236}">
-                <a16:creationId xmlns:a16="http://schemas.microsoft.com/office/drawing/2014/main" id="{1728E57F-8D66-4858-83BE-3FE23A41A07B}"/>
+                <a16:creationId xmlns:a16="http://schemas.microsoft.com/office/drawing/2014/main" id="{E4D466B2-A83B-42C3-88A9-7401DB8E2524}"/>
               </a:ext>
             </a:extLst>
           </p:cNvPr>
@@ -5656,51 +6944,47 @@
           <a:p>
             <a:r>
               <a:rPr lang="en-PH" dirty="0"/>
-              <a:t>A library for </a:t>
+              <a:t>Made in </a:t>
             </a:r>
             <a:r>
               <a:rPr lang="en-PH" b="1" dirty="0"/>
-              <a:t>managing views</a:t>
-            </a:r>
-          </a:p>
-          <a:p>
-            <a:r>
-              <a:rPr lang="en-PH" dirty="0"/>
-              <a:t>A </a:t>
+              <a:t>March 2013</a:t>
+            </a:r>
+            <a:r>
+              <a:rPr lang="en-PH" dirty="0"/>
+              <a:t> by </a:t>
             </a:r>
             <a:r>
               <a:rPr lang="en-PH" b="1" dirty="0"/>
-              <a:t>consistent</a:t>
-            </a:r>
-            <a:r>
-              <a:rPr lang="en-PH" dirty="0"/>
-              <a:t>, </a:t>
+              <a:t>Facebook</a:t>
+            </a:r>
+          </a:p>
+          <a:p>
+            <a:r>
+              <a:rPr lang="en-PH" dirty="0"/>
+              <a:t>Licensed under </a:t>
             </a:r>
             <a:r>
               <a:rPr lang="en-PH" b="1" dirty="0"/>
-              <a:t>declarative</a:t>
-            </a:r>
-            <a:r>
-              <a:rPr lang="en-PH" dirty="0"/>
-              <a:t> </a:t>
+              <a:t>BSD + Patents</a:t>
+            </a:r>
+            <a:r>
+              <a:rPr lang="en-PH" dirty="0"/>
+              <a:t>, but changed to </a:t>
             </a:r>
             <a:r>
               <a:rPr lang="en-PH" b="1" dirty="0"/>
-              <a:t>way</a:t>
-            </a:r>
-            <a:r>
-              <a:rPr lang="en-PH" dirty="0"/>
-              <a:t> for templates</a:t>
-            </a:r>
-          </a:p>
-          <a:p>
-            <a:r>
-              <a:rPr lang="en-PH" dirty="0"/>
-              <a:t>An easy approach for </a:t>
-            </a:r>
+              <a:t>MIT</a:t>
+            </a:r>
+          </a:p>
+          <a:p>
             <a:r>
               <a:rPr lang="en-PH" b="1" dirty="0"/>
-              <a:t>data-driven documents</a:t>
+              <a:t>112M</a:t>
+            </a:r>
+            <a:r>
+              <a:rPr lang="en-PH" dirty="0"/>
+              <a:t> total downloads since its inception (as of April 2018)</a:t>
             </a:r>
           </a:p>
         </p:txBody>
@@ -5708,7 +6992,7 @@
     </p:spTree>
     <p:extLst>
       <p:ext uri="{BB962C8B-B14F-4D97-AF65-F5344CB8AC3E}">
-        <p14:creationId xmlns:p14="http://schemas.microsoft.com/office/powerpoint/2010/main" val="2364712256"/>
+        <p14:creationId xmlns:p14="http://schemas.microsoft.com/office/powerpoint/2010/main" val="3883524235"/>
       </p:ext>
     </p:extLst>
   </p:cSld>
@@ -5740,7 +7024,7 @@
           <p:cNvPr id="2" name="Title 1">
             <a:extLst>
               <a:ext uri="{FF2B5EF4-FFF2-40B4-BE49-F238E27FC236}">
-                <a16:creationId xmlns:a16="http://schemas.microsoft.com/office/drawing/2014/main" id="{1304DCC8-5CE4-458E-83FB-28CDAE57AEE8}"/>
+                <a16:creationId xmlns:a16="http://schemas.microsoft.com/office/drawing/2014/main" id="{5C0791EA-B3F7-4E99-A948-0683A5AF9F9C}"/>
               </a:ext>
             </a:extLst>
           </p:cNvPr>
@@ -5758,7 +7042,7 @@
           <a:p>
             <a:r>
               <a:rPr lang="en-PH" dirty="0"/>
-              <a:t>The Limitations</a:t>
+              <a:t>The Purpose</a:t>
             </a:r>
           </a:p>
         </p:txBody>
@@ -5768,7 +7052,7 @@
           <p:cNvPr id="3" name="Content Placeholder 2">
             <a:extLst>
               <a:ext uri="{FF2B5EF4-FFF2-40B4-BE49-F238E27FC236}">
-                <a16:creationId xmlns:a16="http://schemas.microsoft.com/office/drawing/2014/main" id="{D86DC5AB-E488-446B-87DB-D504888A79FE}"/>
+                <a16:creationId xmlns:a16="http://schemas.microsoft.com/office/drawing/2014/main" id="{1728E57F-8D66-4858-83BE-3FE23A41A07B}"/>
               </a:ext>
             </a:extLst>
           </p:cNvPr>
@@ -5786,50 +7070,59 @@
           <a:p>
             <a:r>
               <a:rPr lang="en-PH" dirty="0"/>
-              <a:t>Manages only the view, </a:t>
+              <a:t>A library for </a:t>
             </a:r>
             <a:r>
               <a:rPr lang="en-PH" b="1" dirty="0"/>
-              <a:t>not the data</a:t>
-            </a:r>
-          </a:p>
-          <a:p>
-            <a:r>
-              <a:rPr lang="en-PH" dirty="0"/>
-              <a:t>Enforces its </a:t>
+              <a:t>managing views</a:t>
+            </a:r>
+          </a:p>
+          <a:p>
+            <a:r>
+              <a:rPr lang="en-PH" dirty="0"/>
+              <a:t>A </a:t>
             </a:r>
             <a:r>
               <a:rPr lang="en-PH" b="1" dirty="0"/>
-              <a:t>own paradigm </a:t>
-            </a:r>
-            <a:r>
-              <a:rPr lang="en-PH" dirty="0"/>
-              <a:t>(configuration, boilerplate, tools, etc.)</a:t>
-            </a:r>
-          </a:p>
-          <a:p>
-            <a:r>
-              <a:rPr lang="en-PH" dirty="0"/>
-              <a:t>Not advisable to run with other </a:t>
+              <a:t>consistent</a:t>
+            </a:r>
+            <a:r>
+              <a:rPr lang="en-PH" dirty="0"/>
+              <a:t>, </a:t>
             </a:r>
             <a:r>
               <a:rPr lang="en-PH" b="1" dirty="0"/>
-              <a:t>DOM manipulation </a:t>
-            </a:r>
-            <a:r>
-              <a:rPr lang="en-PH" dirty="0"/>
-              <a:t>libraries</a:t>
-            </a:r>
-          </a:p>
-          <a:p>
-            <a:endParaRPr lang="en-PH" dirty="0"/>
+              <a:t>declarative</a:t>
+            </a:r>
+            <a:r>
+              <a:rPr lang="en-PH" dirty="0"/>
+              <a:t> </a:t>
+            </a:r>
+            <a:r>
+              <a:rPr lang="en-PH" b="1" dirty="0"/>
+              <a:t>way</a:t>
+            </a:r>
+            <a:r>
+              <a:rPr lang="en-PH" dirty="0"/>
+              <a:t> for templates</a:t>
+            </a:r>
+          </a:p>
+          <a:p>
+            <a:r>
+              <a:rPr lang="en-PH" dirty="0"/>
+              <a:t>An easy approach for </a:t>
+            </a:r>
+            <a:r>
+              <a:rPr lang="en-PH" b="1" dirty="0"/>
+              <a:t>data-driven documents</a:t>
+            </a:r>
           </a:p>
         </p:txBody>
       </p:sp>
     </p:spTree>
     <p:extLst>
       <p:ext uri="{BB962C8B-B14F-4D97-AF65-F5344CB8AC3E}">
-        <p14:creationId xmlns:p14="http://schemas.microsoft.com/office/powerpoint/2010/main" val="1557071108"/>
+        <p14:creationId xmlns:p14="http://schemas.microsoft.com/office/powerpoint/2010/main" val="2364712256"/>
       </p:ext>
     </p:extLst>
   </p:cSld>
@@ -5861,7 +7154,7 @@
           <p:cNvPr id="2" name="Title 1">
             <a:extLst>
               <a:ext uri="{FF2B5EF4-FFF2-40B4-BE49-F238E27FC236}">
-                <a16:creationId xmlns:a16="http://schemas.microsoft.com/office/drawing/2014/main" id="{E34A362B-2FC1-4C29-A57A-D151CFF69CAC}"/>
+                <a16:creationId xmlns:a16="http://schemas.microsoft.com/office/drawing/2014/main" id="{1304DCC8-5CE4-458E-83FB-28CDAE57AEE8}"/>
               </a:ext>
             </a:extLst>
           </p:cNvPr>
@@ -5879,7 +7172,7 @@
           <a:p>
             <a:r>
               <a:rPr lang="en-PH" dirty="0"/>
-              <a:t>The Features</a:t>
+              <a:t>The Limitations</a:t>
             </a:r>
           </a:p>
         </p:txBody>
@@ -5889,7 +7182,7 @@
           <p:cNvPr id="3" name="Content Placeholder 2">
             <a:extLst>
               <a:ext uri="{FF2B5EF4-FFF2-40B4-BE49-F238E27FC236}">
-                <a16:creationId xmlns:a16="http://schemas.microsoft.com/office/drawing/2014/main" id="{9005C6B1-D8FB-4F6D-9512-538BA6BFE240}"/>
+                <a16:creationId xmlns:a16="http://schemas.microsoft.com/office/drawing/2014/main" id="{D86DC5AB-E488-446B-87DB-D504888A79FE}"/>
               </a:ext>
             </a:extLst>
           </p:cNvPr>
@@ -5906,40 +7199,51 @@
           <a:lstStyle/>
           <a:p>
             <a:r>
+              <a:rPr lang="en-PH" dirty="0"/>
+              <a:t>Manages only the view, </a:t>
+            </a:r>
+            <a:r>
               <a:rPr lang="en-PH" b="1" dirty="0"/>
-              <a:t>Unidirectional</a:t>
-            </a:r>
-            <a:r>
-              <a:rPr lang="en-PH" dirty="0"/>
-              <a:t> data flow</a:t>
-            </a:r>
-          </a:p>
-          <a:p>
+              <a:t>not the data</a:t>
+            </a:r>
+          </a:p>
+          <a:p>
+            <a:r>
+              <a:rPr lang="en-PH" dirty="0"/>
+              <a:t>Enforces its </a:t>
+            </a:r>
             <a:r>
               <a:rPr lang="en-PH" b="1" dirty="0"/>
-              <a:t>Declarative</a:t>
-            </a:r>
-            <a:r>
-              <a:rPr lang="en-PH" dirty="0"/>
-              <a:t> component definition</a:t>
-            </a:r>
-          </a:p>
-          <a:p>
+              <a:t>own paradigm </a:t>
+            </a:r>
+            <a:r>
+              <a:rPr lang="en-PH" dirty="0"/>
+              <a:t>(configuration, boilerplate, tools, etc.)</a:t>
+            </a:r>
+          </a:p>
+          <a:p>
+            <a:r>
+              <a:rPr lang="en-PH" dirty="0"/>
+              <a:t>Not advisable to run with other </a:t>
+            </a:r>
             <a:r>
               <a:rPr lang="en-PH" b="1" dirty="0"/>
-              <a:t>Virtual</a:t>
-            </a:r>
-            <a:r>
-              <a:rPr lang="en-PH" dirty="0"/>
-              <a:t> DOM</a:t>
-            </a:r>
+              <a:t>DOM manipulation </a:t>
+            </a:r>
+            <a:r>
+              <a:rPr lang="en-PH" dirty="0"/>
+              <a:t>libraries</a:t>
+            </a:r>
+          </a:p>
+          <a:p>
+            <a:endParaRPr lang="en-PH" dirty="0"/>
           </a:p>
         </p:txBody>
       </p:sp>
     </p:spTree>
     <p:extLst>
       <p:ext uri="{BB962C8B-B14F-4D97-AF65-F5344CB8AC3E}">
-        <p14:creationId xmlns:p14="http://schemas.microsoft.com/office/powerpoint/2010/main" val="955329505"/>
+        <p14:creationId xmlns:p14="http://schemas.microsoft.com/office/powerpoint/2010/main" val="1557071108"/>
       </p:ext>
     </p:extLst>
   </p:cSld>
@@ -5968,10 +7272,10 @@
       </p:grpSpPr>
       <p:sp>
         <p:nvSpPr>
-          <p:cNvPr id="4" name="Title 3">
-            <a:extLst>
-              <a:ext uri="{FF2B5EF4-FFF2-40B4-BE49-F238E27FC236}">
-                <a16:creationId xmlns:a16="http://schemas.microsoft.com/office/drawing/2014/main" id="{EC34D1CD-675F-44F1-96C0-D0A5F1DA3E80}"/>
+          <p:cNvPr id="2" name="Title 1">
+            <a:extLst>
+              <a:ext uri="{FF2B5EF4-FFF2-40B4-BE49-F238E27FC236}">
+                <a16:creationId xmlns:a16="http://schemas.microsoft.com/office/drawing/2014/main" id="{E34A362B-2FC1-4C29-A57A-D151CFF69CAC}"/>
               </a:ext>
             </a:extLst>
           </p:cNvPr>
@@ -5989,35 +7293,59 @@
           <a:p>
             <a:r>
               <a:rPr lang="en-PH" dirty="0"/>
-              <a:t>Getting Started</a:t>
-            </a:r>
-          </a:p>
-        </p:txBody>
-      </p:sp>
-      <p:sp>
-        <p:nvSpPr>
-          <p:cNvPr id="5" name="Text Placeholder 4">
-            <a:extLst>
-              <a:ext uri="{FF2B5EF4-FFF2-40B4-BE49-F238E27FC236}">
-                <a16:creationId xmlns:a16="http://schemas.microsoft.com/office/drawing/2014/main" id="{A544CD81-8895-4C37-A640-AE2C61F4CDCE}"/>
-              </a:ext>
-            </a:extLst>
-          </p:cNvPr>
-          <p:cNvSpPr>
-            <a:spLocks noGrp="1"/>
-          </p:cNvSpPr>
-          <p:nvPr>
-            <p:ph type="body" idx="1"/>
-          </p:nvPr>
-        </p:nvSpPr>
-        <p:spPr/>
-        <p:txBody>
-          <a:bodyPr/>
-          <a:lstStyle/>
-          <a:p>
-            <a:r>
-              <a:rPr lang="en-PH" dirty="0"/>
-              <a:t>React fundamentals</a:t>
+              <a:t>The Features</a:t>
+            </a:r>
+          </a:p>
+        </p:txBody>
+      </p:sp>
+      <p:sp>
+        <p:nvSpPr>
+          <p:cNvPr id="3" name="Content Placeholder 2">
+            <a:extLst>
+              <a:ext uri="{FF2B5EF4-FFF2-40B4-BE49-F238E27FC236}">
+                <a16:creationId xmlns:a16="http://schemas.microsoft.com/office/drawing/2014/main" id="{9005C6B1-D8FB-4F6D-9512-538BA6BFE240}"/>
+              </a:ext>
+            </a:extLst>
+          </p:cNvPr>
+          <p:cNvSpPr>
+            <a:spLocks noGrp="1"/>
+          </p:cNvSpPr>
+          <p:nvPr>
+            <p:ph idx="1"/>
+          </p:nvPr>
+        </p:nvSpPr>
+        <p:spPr/>
+        <p:txBody>
+          <a:bodyPr/>
+          <a:lstStyle/>
+          <a:p>
+            <a:r>
+              <a:rPr lang="en-PH" b="1" dirty="0"/>
+              <a:t>Unidirectional</a:t>
+            </a:r>
+            <a:r>
+              <a:rPr lang="en-PH" dirty="0"/>
+              <a:t> data flow</a:t>
+            </a:r>
+          </a:p>
+          <a:p>
+            <a:r>
+              <a:rPr lang="en-PH" b="1" dirty="0"/>
+              <a:t>Declarative</a:t>
+            </a:r>
+            <a:r>
+              <a:rPr lang="en-PH" dirty="0"/>
+              <a:t> component definition</a:t>
+            </a:r>
+          </a:p>
+          <a:p>
+            <a:r>
+              <a:rPr lang="en-PH" b="1" dirty="0"/>
+              <a:t>Virtual</a:t>
+            </a:r>
+            <a:r>
+              <a:rPr lang="en-PH" dirty="0"/>
+              <a:t> DOM</a:t>
             </a:r>
           </a:p>
         </p:txBody>
@@ -6025,7 +7353,7 @@
     </p:spTree>
     <p:extLst>
       <p:ext uri="{BB962C8B-B14F-4D97-AF65-F5344CB8AC3E}">
-        <p14:creationId xmlns:p14="http://schemas.microsoft.com/office/powerpoint/2010/main" val="3305414340"/>
+        <p14:creationId xmlns:p14="http://schemas.microsoft.com/office/powerpoint/2010/main" val="955329505"/>
       </p:ext>
     </p:extLst>
   </p:cSld>
@@ -6057,7 +7385,7 @@
           <p:cNvPr id="4" name="Title 3">
             <a:extLst>
               <a:ext uri="{FF2B5EF4-FFF2-40B4-BE49-F238E27FC236}">
-                <a16:creationId xmlns:a16="http://schemas.microsoft.com/office/drawing/2014/main" id="{4421EB58-D040-4C31-8347-354447973567}"/>
+                <a16:creationId xmlns:a16="http://schemas.microsoft.com/office/drawing/2014/main" id="{EC34D1CD-675F-44F1-96C0-D0A5F1DA3E80}"/>
               </a:ext>
             </a:extLst>
           </p:cNvPr>
@@ -6075,67 +7403,35 @@
           <a:p>
             <a:r>
               <a:rPr lang="en-PH" dirty="0"/>
-              <a:t>JSX and Syntax Additions</a:t>
-            </a:r>
-          </a:p>
-        </p:txBody>
-      </p:sp>
-      <p:sp>
-        <p:nvSpPr>
-          <p:cNvPr id="5" name="Content Placeholder 4">
-            <a:extLst>
-              <a:ext uri="{FF2B5EF4-FFF2-40B4-BE49-F238E27FC236}">
-                <a16:creationId xmlns:a16="http://schemas.microsoft.com/office/drawing/2014/main" id="{15DF5AD8-1C40-4063-BF8E-6CE30D005205}"/>
-              </a:ext>
-            </a:extLst>
-          </p:cNvPr>
-          <p:cNvSpPr>
-            <a:spLocks noGrp="1"/>
-          </p:cNvSpPr>
-          <p:nvPr>
-            <p:ph idx="1"/>
-          </p:nvPr>
-        </p:nvSpPr>
-        <p:spPr/>
-        <p:txBody>
-          <a:bodyPr/>
-          <a:lstStyle/>
-          <a:p>
-            <a:r>
-              <a:rPr lang="en-PH" dirty="0"/>
-              <a:t>JSX is </a:t>
-            </a:r>
-            <a:r>
-              <a:rPr lang="en-PH" b="1" dirty="0"/>
-              <a:t>syntactic sugar </a:t>
-            </a:r>
-            <a:r>
-              <a:rPr lang="en-PH" dirty="0"/>
-              <a:t>for </a:t>
-            </a:r>
-            <a:r>
-              <a:rPr lang="en-PH" b="1" dirty="0"/>
-              <a:t>easier declaration of templates</a:t>
-            </a:r>
-          </a:p>
-          <a:p>
-            <a:r>
-              <a:rPr lang="en-PH" dirty="0"/>
-              <a:t>JSX is just </a:t>
-            </a:r>
-            <a:r>
-              <a:rPr lang="en-PH" b="1" dirty="0"/>
-              <a:t>JS with additional XML</a:t>
-            </a:r>
-          </a:p>
-          <a:p>
-            <a:r>
-              <a:rPr lang="en-PH" dirty="0"/>
-              <a:t>Requires </a:t>
-            </a:r>
-            <a:r>
-              <a:rPr lang="en-PH" b="1" dirty="0"/>
-              <a:t>Babel</a:t>
+              <a:t>Getting Started</a:t>
+            </a:r>
+          </a:p>
+        </p:txBody>
+      </p:sp>
+      <p:sp>
+        <p:nvSpPr>
+          <p:cNvPr id="5" name="Text Placeholder 4">
+            <a:extLst>
+              <a:ext uri="{FF2B5EF4-FFF2-40B4-BE49-F238E27FC236}">
+                <a16:creationId xmlns:a16="http://schemas.microsoft.com/office/drawing/2014/main" id="{A544CD81-8895-4C37-A640-AE2C61F4CDCE}"/>
+              </a:ext>
+            </a:extLst>
+          </p:cNvPr>
+          <p:cNvSpPr>
+            <a:spLocks noGrp="1"/>
+          </p:cNvSpPr>
+          <p:nvPr>
+            <p:ph type="body" idx="1"/>
+          </p:nvPr>
+        </p:nvSpPr>
+        <p:spPr/>
+        <p:txBody>
+          <a:bodyPr/>
+          <a:lstStyle/>
+          <a:p>
+            <a:r>
+              <a:rPr lang="en-PH" dirty="0"/>
+              <a:t>React fundamentals</a:t>
             </a:r>
           </a:p>
         </p:txBody>
@@ -6143,7 +7439,7 @@
     </p:spTree>
     <p:extLst>
       <p:ext uri="{BB962C8B-B14F-4D97-AF65-F5344CB8AC3E}">
-        <p14:creationId xmlns:p14="http://schemas.microsoft.com/office/powerpoint/2010/main" val="314496845"/>
+        <p14:creationId xmlns:p14="http://schemas.microsoft.com/office/powerpoint/2010/main" val="3305414340"/>
       </p:ext>
     </p:extLst>
   </p:cSld>
@@ -6172,10 +7468,10 @@
       </p:grpSpPr>
       <p:sp>
         <p:nvSpPr>
-          <p:cNvPr id="2" name="Title 1">
-            <a:extLst>
-              <a:ext uri="{FF2B5EF4-FFF2-40B4-BE49-F238E27FC236}">
-                <a16:creationId xmlns:a16="http://schemas.microsoft.com/office/drawing/2014/main" id="{4D574C09-5AE5-401C-9BE4-9E81768A21A8}"/>
+          <p:cNvPr id="4" name="Title 3">
+            <a:extLst>
+              <a:ext uri="{FF2B5EF4-FFF2-40B4-BE49-F238E27FC236}">
+                <a16:creationId xmlns:a16="http://schemas.microsoft.com/office/drawing/2014/main" id="{4421EB58-D040-4C31-8347-354447973567}"/>
               </a:ext>
             </a:extLst>
           </p:cNvPr>
@@ -6193,47 +7489,75 @@
           <a:p>
             <a:r>
               <a:rPr lang="en-PH" dirty="0"/>
-              <a:t>JSX - Before</a:t>
-            </a:r>
-          </a:p>
-        </p:txBody>
-      </p:sp>
-      <p:pic>
-        <p:nvPicPr>
-          <p:cNvPr id="6" name="Content Placeholder 5">
-            <a:extLst>
-              <a:ext uri="{FF2B5EF4-FFF2-40B4-BE49-F238E27FC236}">
-                <a16:creationId xmlns:a16="http://schemas.microsoft.com/office/drawing/2014/main" id="{84B3E32D-08D4-4FAF-8C6A-D52FCE5FB414}"/>
-              </a:ext>
-            </a:extLst>
-          </p:cNvPr>
-          <p:cNvPicPr>
-            <a:picLocks noGrp="1" noChangeAspect="1"/>
-          </p:cNvPicPr>
+              <a:t>JSX and Syntax Additions</a:t>
+            </a:r>
+          </a:p>
+        </p:txBody>
+      </p:sp>
+      <p:sp>
+        <p:nvSpPr>
+          <p:cNvPr id="5" name="Content Placeholder 4">
+            <a:extLst>
+              <a:ext uri="{FF2B5EF4-FFF2-40B4-BE49-F238E27FC236}">
+                <a16:creationId xmlns:a16="http://schemas.microsoft.com/office/drawing/2014/main" id="{15DF5AD8-1C40-4063-BF8E-6CE30D005205}"/>
+              </a:ext>
+            </a:extLst>
+          </p:cNvPr>
+          <p:cNvSpPr>
+            <a:spLocks noGrp="1"/>
+          </p:cNvSpPr>
           <p:nvPr>
             <p:ph idx="1"/>
           </p:nvPr>
-        </p:nvPicPr>
-        <p:blipFill>
-          <a:blip r:embed="rId2"/>
-          <a:stretch>
-            <a:fillRect/>
-          </a:stretch>
-        </p:blipFill>
-        <p:spPr>
-          <a:xfrm>
-            <a:off x="646669" y="2201333"/>
-            <a:ext cx="10898662" cy="3599922"/>
-          </a:xfrm>
-          <a:prstGeom prst="rect">
-            <a:avLst/>
-          </a:prstGeom>
-        </p:spPr>
-      </p:pic>
+        </p:nvSpPr>
+        <p:spPr/>
+        <p:txBody>
+          <a:bodyPr/>
+          <a:lstStyle/>
+          <a:p>
+            <a:r>
+              <a:rPr lang="en-PH" dirty="0"/>
+              <a:t>JSX is </a:t>
+            </a:r>
+            <a:r>
+              <a:rPr lang="en-PH" b="1" dirty="0"/>
+              <a:t>syntactic sugar </a:t>
+            </a:r>
+            <a:r>
+              <a:rPr lang="en-PH" dirty="0"/>
+              <a:t>for </a:t>
+            </a:r>
+            <a:r>
+              <a:rPr lang="en-PH" b="1" dirty="0"/>
+              <a:t>easier declaration of templates</a:t>
+            </a:r>
+          </a:p>
+          <a:p>
+            <a:r>
+              <a:rPr lang="en-PH" dirty="0"/>
+              <a:t>JSX is just </a:t>
+            </a:r>
+            <a:r>
+              <a:rPr lang="en-PH" b="1" dirty="0"/>
+              <a:t>JS with additional XML</a:t>
+            </a:r>
+          </a:p>
+          <a:p>
+            <a:r>
+              <a:rPr lang="en-PH" dirty="0"/>
+              <a:t>Requires </a:t>
+            </a:r>
+            <a:r>
+              <a:rPr lang="en-PH" b="1" dirty="0"/>
+              <a:t>Babel</a:t>
+            </a:r>
+          </a:p>
+        </p:txBody>
+      </p:sp>
     </p:spTree>
     <p:extLst>
       <p:ext uri="{BB962C8B-B14F-4D97-AF65-F5344CB8AC3E}">
-        <p14:creationId xmlns:p14="http://schemas.microsoft.com/office/powerpoint/2010/main" val="2378590781"/>
+        <p14:creationId xmlns:p14="http://schemas.microsoft.com/office/powerpoint/2010/main" val="314496845"/>
       </p:ext>
     </p:extLst>
   </p:cSld>
@@ -6283,17 +7607,17 @@
           <a:p>
             <a:r>
               <a:rPr lang="en-PH" dirty="0"/>
-              <a:t>JSX - After</a:t>
+              <a:t>JSX - Before</a:t>
             </a:r>
           </a:p>
         </p:txBody>
       </p:sp>
       <p:pic>
         <p:nvPicPr>
-          <p:cNvPr id="17" name="Content Placeholder 6">
-            <a:extLst>
-              <a:ext uri="{FF2B5EF4-FFF2-40B4-BE49-F238E27FC236}">
-                <a16:creationId xmlns:a16="http://schemas.microsoft.com/office/drawing/2014/main" id="{FCA6ED38-3FD2-4942-A959-5E79F05C5F82}"/>
+          <p:cNvPr id="6" name="Content Placeholder 5">
+            <a:extLst>
+              <a:ext uri="{FF2B5EF4-FFF2-40B4-BE49-F238E27FC236}">
+                <a16:creationId xmlns:a16="http://schemas.microsoft.com/office/drawing/2014/main" id="{84B3E32D-08D4-4FAF-8C6A-D52FCE5FB414}"/>
               </a:ext>
             </a:extLst>
           </p:cNvPr>
@@ -6312,8 +7636,8 @@
         </p:blipFill>
         <p:spPr>
           <a:xfrm>
-            <a:off x="627134" y="2630311"/>
-            <a:ext cx="10937732" cy="2741966"/>
+            <a:off x="646669" y="2201333"/>
+            <a:ext cx="10898662" cy="3599922"/>
           </a:xfrm>
           <a:prstGeom prst="rect">
             <a:avLst/>
@@ -6323,7 +7647,7 @@
     </p:spTree>
     <p:extLst>
       <p:ext uri="{BB962C8B-B14F-4D97-AF65-F5344CB8AC3E}">
-        <p14:creationId xmlns:p14="http://schemas.microsoft.com/office/powerpoint/2010/main" val="2283538873"/>
+        <p14:creationId xmlns:p14="http://schemas.microsoft.com/office/powerpoint/2010/main" val="2378590781"/>
       </p:ext>
     </p:extLst>
   </p:cSld>
@@ -6532,4 +7856,299 @@
     </a:ext>
   </a:extLst>
 </a:theme>
+</file>
+
+<file path=ppt/theme/theme2.xml><?xml version="1.0" encoding="utf-8"?>
+<a:theme xmlns:a="http://schemas.openxmlformats.org/drawingml/2006/main" name="Office Theme">
+  <a:themeElements>
+    <a:clrScheme name="Office">
+      <a:dk1>
+        <a:sysClr val="windowText" lastClr="000000"/>
+      </a:dk1>
+      <a:lt1>
+        <a:sysClr val="window" lastClr="FFFFFF"/>
+      </a:lt1>
+      <a:dk2>
+        <a:srgbClr val="44546A"/>
+      </a:dk2>
+      <a:lt2>
+        <a:srgbClr val="E7E6E6"/>
+      </a:lt2>
+      <a:accent1>
+        <a:srgbClr val="4472C4"/>
+      </a:accent1>
+      <a:accent2>
+        <a:srgbClr val="ED7D31"/>
+      </a:accent2>
+      <a:accent3>
+        <a:srgbClr val="A5A5A5"/>
+      </a:accent3>
+      <a:accent4>
+        <a:srgbClr val="FFC000"/>
+      </a:accent4>
+      <a:accent5>
+        <a:srgbClr val="5B9BD5"/>
+      </a:accent5>
+      <a:accent6>
+        <a:srgbClr val="70AD47"/>
+      </a:accent6>
+      <a:hlink>
+        <a:srgbClr val="0563C1"/>
+      </a:hlink>
+      <a:folHlink>
+        <a:srgbClr val="954F72"/>
+      </a:folHlink>
+    </a:clrScheme>
+    <a:fontScheme name="Office">
+      <a:majorFont>
+        <a:latin typeface="Calibri Light" panose="020F0302020204030204"/>
+        <a:ea typeface=""/>
+        <a:cs typeface=""/>
+        <a:font script="Jpan" typeface="游ゴシック Light"/>
+        <a:font script="Hang" typeface="맑은 고딕"/>
+        <a:font script="Hans" typeface="等线 Light"/>
+        <a:font script="Hant" typeface="新細明體"/>
+        <a:font script="Arab" typeface="Times New Roman"/>
+        <a:font script="Hebr" typeface="Times New Roman"/>
+        <a:font script="Thai" typeface="Angsana New"/>
+        <a:font script="Ethi" typeface="Nyala"/>
+        <a:font script="Beng" typeface="Vrinda"/>
+        <a:font script="Gujr" typeface="Shruti"/>
+        <a:font script="Khmr" typeface="MoolBoran"/>
+        <a:font script="Knda" typeface="Tunga"/>
+        <a:font script="Guru" typeface="Raavi"/>
+        <a:font script="Cans" typeface="Euphemia"/>
+        <a:font script="Cher" typeface="Plantagenet Cherokee"/>
+        <a:font script="Yiii" typeface="Microsoft Yi Baiti"/>
+        <a:font script="Tibt" typeface="Microsoft Himalaya"/>
+        <a:font script="Thaa" typeface="MV Boli"/>
+        <a:font script="Deva" typeface="Mangal"/>
+        <a:font script="Telu" typeface="Gautami"/>
+        <a:font script="Taml" typeface="Latha"/>
+        <a:font script="Syrc" typeface="Estrangelo Edessa"/>
+        <a:font script="Orya" typeface="Kalinga"/>
+        <a:font script="Mlym" typeface="Kartika"/>
+        <a:font script="Laoo" typeface="DokChampa"/>
+        <a:font script="Sinh" typeface="Iskoola Pota"/>
+        <a:font script="Mong" typeface="Mongolian Baiti"/>
+        <a:font script="Viet" typeface="Times New Roman"/>
+        <a:font script="Uigh" typeface="Microsoft Uighur"/>
+        <a:font script="Geor" typeface="Sylfaen"/>
+        <a:font script="Armn" typeface="Arial"/>
+        <a:font script="Bugi" typeface="Leelawadee UI"/>
+        <a:font script="Bopo" typeface="Microsoft JhengHei"/>
+        <a:font script="Java" typeface="Javanese Text"/>
+        <a:font script="Lisu" typeface="Segoe UI"/>
+        <a:font script="Mymr" typeface="Myanmar Text"/>
+        <a:font script="Nkoo" typeface="Ebrima"/>
+        <a:font script="Olck" typeface="Nirmala UI"/>
+        <a:font script="Osma" typeface="Ebrima"/>
+        <a:font script="Phag" typeface="Phagspa"/>
+        <a:font script="Syrn" typeface="Estrangelo Edessa"/>
+        <a:font script="Syrj" typeface="Estrangelo Edessa"/>
+        <a:font script="Syre" typeface="Estrangelo Edessa"/>
+        <a:font script="Sora" typeface="Nirmala UI"/>
+        <a:font script="Tale" typeface="Microsoft Tai Le"/>
+        <a:font script="Talu" typeface="Microsoft New Tai Lue"/>
+        <a:font script="Tfng" typeface="Ebrima"/>
+      </a:majorFont>
+      <a:minorFont>
+        <a:latin typeface="Calibri" panose="020F0502020204030204"/>
+        <a:ea typeface=""/>
+        <a:cs typeface=""/>
+        <a:font script="Jpan" typeface="游ゴシック"/>
+        <a:font script="Hang" typeface="맑은 고딕"/>
+        <a:font script="Hans" typeface="等线"/>
+        <a:font script="Hant" typeface="新細明體"/>
+        <a:font script="Arab" typeface="Arial"/>
+        <a:font script="Hebr" typeface="Arial"/>
+        <a:font script="Thai" typeface="Cordia New"/>
+        <a:font script="Ethi" typeface="Nyala"/>
+        <a:font script="Beng" typeface="Vrinda"/>
+        <a:font script="Gujr" typeface="Shruti"/>
+        <a:font script="Khmr" typeface="DaunPenh"/>
+        <a:font script="Knda" typeface="Tunga"/>
+        <a:font script="Guru" typeface="Raavi"/>
+        <a:font script="Cans" typeface="Euphemia"/>
+        <a:font script="Cher" typeface="Plantagenet Cherokee"/>
+        <a:font script="Yiii" typeface="Microsoft Yi Baiti"/>
+        <a:font script="Tibt" typeface="Microsoft Himalaya"/>
+        <a:font script="Thaa" typeface="MV Boli"/>
+        <a:font script="Deva" typeface="Mangal"/>
+        <a:font script="Telu" typeface="Gautami"/>
+        <a:font script="Taml" typeface="Latha"/>
+        <a:font script="Syrc" typeface="Estrangelo Edessa"/>
+        <a:font script="Orya" typeface="Kalinga"/>
+        <a:font script="Mlym" typeface="Kartika"/>
+        <a:font script="Laoo" typeface="DokChampa"/>
+        <a:font script="Sinh" typeface="Iskoola Pota"/>
+        <a:font script="Mong" typeface="Mongolian Baiti"/>
+        <a:font script="Viet" typeface="Arial"/>
+        <a:font script="Uigh" typeface="Microsoft Uighur"/>
+        <a:font script="Geor" typeface="Sylfaen"/>
+        <a:font script="Armn" typeface="Arial"/>
+        <a:font script="Bugi" typeface="Leelawadee UI"/>
+        <a:font script="Bopo" typeface="Microsoft JhengHei"/>
+        <a:font script="Java" typeface="Javanese Text"/>
+        <a:font script="Lisu" typeface="Segoe UI"/>
+        <a:font script="Mymr" typeface="Myanmar Text"/>
+        <a:font script="Nkoo" typeface="Ebrima"/>
+        <a:font script="Olck" typeface="Nirmala UI"/>
+        <a:font script="Osma" typeface="Ebrima"/>
+        <a:font script="Phag" typeface="Phagspa"/>
+        <a:font script="Syrn" typeface="Estrangelo Edessa"/>
+        <a:font script="Syrj" typeface="Estrangelo Edessa"/>
+        <a:font script="Syre" typeface="Estrangelo Edessa"/>
+        <a:font script="Sora" typeface="Nirmala UI"/>
+        <a:font script="Tale" typeface="Microsoft Tai Le"/>
+        <a:font script="Talu" typeface="Microsoft New Tai Lue"/>
+        <a:font script="Tfng" typeface="Ebrima"/>
+      </a:minorFont>
+    </a:fontScheme>
+    <a:fmtScheme name="Office">
+      <a:fillStyleLst>
+        <a:solidFill>
+          <a:schemeClr val="phClr"/>
+        </a:solidFill>
+        <a:gradFill rotWithShape="1">
+          <a:gsLst>
+            <a:gs pos="0">
+              <a:schemeClr val="phClr">
+                <a:lumMod val="110000"/>
+                <a:satMod val="105000"/>
+                <a:tint val="67000"/>
+              </a:schemeClr>
+            </a:gs>
+            <a:gs pos="50000">
+              <a:schemeClr val="phClr">
+                <a:lumMod val="105000"/>
+                <a:satMod val="103000"/>
+                <a:tint val="73000"/>
+              </a:schemeClr>
+            </a:gs>
+            <a:gs pos="100000">
+              <a:schemeClr val="phClr">
+                <a:lumMod val="105000"/>
+                <a:satMod val="109000"/>
+                <a:tint val="81000"/>
+              </a:schemeClr>
+            </a:gs>
+          </a:gsLst>
+          <a:lin ang="5400000" scaled="0"/>
+        </a:gradFill>
+        <a:gradFill rotWithShape="1">
+          <a:gsLst>
+            <a:gs pos="0">
+              <a:schemeClr val="phClr">
+                <a:satMod val="103000"/>
+                <a:lumMod val="102000"/>
+                <a:tint val="94000"/>
+              </a:schemeClr>
+            </a:gs>
+            <a:gs pos="50000">
+              <a:schemeClr val="phClr">
+                <a:satMod val="110000"/>
+                <a:lumMod val="100000"/>
+                <a:shade val="100000"/>
+              </a:schemeClr>
+            </a:gs>
+            <a:gs pos="100000">
+              <a:schemeClr val="phClr">
+                <a:lumMod val="99000"/>
+                <a:satMod val="120000"/>
+                <a:shade val="78000"/>
+              </a:schemeClr>
+            </a:gs>
+          </a:gsLst>
+          <a:lin ang="5400000" scaled="0"/>
+        </a:gradFill>
+      </a:fillStyleLst>
+      <a:lnStyleLst>
+        <a:ln w="6350" cap="flat" cmpd="sng" algn="ctr">
+          <a:solidFill>
+            <a:schemeClr val="phClr"/>
+          </a:solidFill>
+          <a:prstDash val="solid"/>
+          <a:miter lim="800000"/>
+        </a:ln>
+        <a:ln w="12700" cap="flat" cmpd="sng" algn="ctr">
+          <a:solidFill>
+            <a:schemeClr val="phClr"/>
+          </a:solidFill>
+          <a:prstDash val="solid"/>
+          <a:miter lim="800000"/>
+        </a:ln>
+        <a:ln w="19050" cap="flat" cmpd="sng" algn="ctr">
+          <a:solidFill>
+            <a:schemeClr val="phClr"/>
+          </a:solidFill>
+          <a:prstDash val="solid"/>
+          <a:miter lim="800000"/>
+        </a:ln>
+      </a:lnStyleLst>
+      <a:effectStyleLst>
+        <a:effectStyle>
+          <a:effectLst/>
+        </a:effectStyle>
+        <a:effectStyle>
+          <a:effectLst/>
+        </a:effectStyle>
+        <a:effectStyle>
+          <a:effectLst>
+            <a:outerShdw blurRad="57150" dist="19050" dir="5400000" algn="ctr" rotWithShape="0">
+              <a:srgbClr val="000000">
+                <a:alpha val="63000"/>
+              </a:srgbClr>
+            </a:outerShdw>
+          </a:effectLst>
+        </a:effectStyle>
+      </a:effectStyleLst>
+      <a:bgFillStyleLst>
+        <a:solidFill>
+          <a:schemeClr val="phClr"/>
+        </a:solidFill>
+        <a:solidFill>
+          <a:schemeClr val="phClr">
+            <a:tint val="95000"/>
+            <a:satMod val="170000"/>
+          </a:schemeClr>
+        </a:solidFill>
+        <a:gradFill rotWithShape="1">
+          <a:gsLst>
+            <a:gs pos="0">
+              <a:schemeClr val="phClr">
+                <a:tint val="93000"/>
+                <a:satMod val="150000"/>
+                <a:shade val="98000"/>
+                <a:lumMod val="102000"/>
+              </a:schemeClr>
+            </a:gs>
+            <a:gs pos="50000">
+              <a:schemeClr val="phClr">
+                <a:tint val="98000"/>
+                <a:satMod val="130000"/>
+                <a:shade val="90000"/>
+                <a:lumMod val="103000"/>
+              </a:schemeClr>
+            </a:gs>
+            <a:gs pos="100000">
+              <a:schemeClr val="phClr">
+                <a:shade val="63000"/>
+                <a:satMod val="120000"/>
+              </a:schemeClr>
+            </a:gs>
+          </a:gsLst>
+          <a:lin ang="5400000" scaled="0"/>
+        </a:gradFill>
+      </a:bgFillStyleLst>
+    </a:fmtScheme>
+  </a:themeElements>
+  <a:objectDefaults/>
+  <a:extraClrSchemeLst/>
+  <a:extLst>
+    <a:ext uri="{05A4C25C-085E-4340-85A3-A5531E510DB2}">
+      <thm15:themeFamily xmlns:thm15="http://schemas.microsoft.com/office/thememl/2012/main" name="Office Theme" id="{62F939B6-93AF-4DB8-9C6B-D6C7DFDC589F}" vid="{4A3C46E8-61CC-4603-A589-7422A47A8E4A}"/>
+    </a:ext>
+  </a:extLst>
+</a:theme>
 </file>
</xml_diff>